<commit_message>
finished formatting missing data lecture
</commit_message>
<xml_diff>
--- a/8_missing_data/latex/figures/saturated_correlates_diagram.pptx
+++ b/8_missing_data/latex/figures/saturated_correlates_diagram.pptx
@@ -5,10 +5,11 @@
     <p:sldMasterId id="2147483720" r:id="rId1"/>
   </p:sldMasterIdLst>
   <p:notesMasterIdLst>
-    <p:notesMasterId r:id="rId3"/>
+    <p:notesMasterId r:id="rId4"/>
   </p:notesMasterIdLst>
   <p:sldIdLst>
     <p:sldId id="261" r:id="rId2"/>
+    <p:sldId id="262" r:id="rId3"/>
   </p:sldIdLst>
   <p:sldSz cx="10799763" cy="10799763"/>
   <p:notesSz cx="6858000" cy="9144000"/>
@@ -3439,14 +3440,14 @@
                 <a:p>
                   <a:pPr algn="ctr"/>
                   <a:r>
-                    <a:rPr lang="en-US" sz="1600" dirty="0">
+                    <a:rPr lang="en-US" dirty="0">
                       <a:solidFill>
                         <a:schemeClr val="tx1"/>
                       </a:solidFill>
                       <a:latin typeface="Times New Roman" panose="02020603050405020304" pitchFamily="18" charset="0"/>
                       <a:cs typeface="Times New Roman" panose="02020603050405020304" pitchFamily="18" charset="0"/>
                     </a:rPr>
-                    <a:t>E1</a:t>
+                    <a:t>A1</a:t>
                   </a:r>
                 </a:p>
               </p:txBody>
@@ -3507,14 +3508,14 @@
                 <a:p>
                   <a:pPr algn="ctr"/>
                   <a:r>
-                    <a:rPr lang="en-US" sz="1600" dirty="0">
+                    <a:rPr lang="en-US" dirty="0">
                       <a:solidFill>
                         <a:schemeClr val="tx1"/>
                       </a:solidFill>
                       <a:latin typeface="Times New Roman" panose="02020603050405020304" pitchFamily="18" charset="0"/>
                       <a:cs typeface="Times New Roman" panose="02020603050405020304" pitchFamily="18" charset="0"/>
                     </a:rPr>
-                    <a:t>E2</a:t>
+                    <a:t>A2</a:t>
                   </a:r>
                 </a:p>
               </p:txBody>
@@ -3575,14 +3576,14 @@
                 <a:p>
                   <a:pPr algn="ctr"/>
                   <a:r>
-                    <a:rPr lang="en-US" sz="1600" dirty="0">
+                    <a:rPr lang="en-US" dirty="0">
                       <a:solidFill>
                         <a:schemeClr val="tx1"/>
                       </a:solidFill>
                       <a:latin typeface="Times New Roman" panose="02020603050405020304" pitchFamily="18" charset="0"/>
                       <a:cs typeface="Times New Roman" panose="02020603050405020304" pitchFamily="18" charset="0"/>
                     </a:rPr>
-                    <a:t>E3</a:t>
+                    <a:t>A3</a:t>
                   </a:r>
                 </a:p>
               </p:txBody>
@@ -3638,14 +3639,14 @@
                 <a:p>
                   <a:pPr algn="ctr"/>
                   <a:r>
-                    <a:rPr lang="en-US" sz="1600" dirty="0">
+                    <a:rPr lang="en-US" dirty="0">
                       <a:solidFill>
                         <a:schemeClr val="tx1"/>
                       </a:solidFill>
                       <a:latin typeface="Times New Roman" panose="02020603050405020304" pitchFamily="18" charset="0"/>
                       <a:cs typeface="Times New Roman" panose="02020603050405020304" pitchFamily="18" charset="0"/>
                     </a:rPr>
-                    <a:t>Extraversion</a:t>
+                    <a:t>Agree</a:t>
                   </a:r>
                 </a:p>
               </p:txBody>
@@ -3749,7 +3750,7 @@
                 <a:p>
                   <a:pPr algn="ctr"/>
                   <a:r>
-                    <a:rPr lang="en-US" sz="1400" dirty="0">
+                    <a:rPr lang="en-US" sz="1600" dirty="0">
                       <a:solidFill>
                         <a:schemeClr val="tx1"/>
                       </a:solidFill>
@@ -3759,16 +3760,16 @@
                     <a:t>u</a:t>
                   </a:r>
                   <a:r>
-                    <a:rPr lang="en-US" sz="1400" baseline="-25000" dirty="0">
+                    <a:rPr lang="en-US" sz="1600" baseline="-25000" dirty="0">
                       <a:solidFill>
                         <a:schemeClr val="tx1"/>
                       </a:solidFill>
                       <a:latin typeface="Times New Roman" panose="02020603050405020304" pitchFamily="18" charset="0"/>
                       <a:cs typeface="Times New Roman" panose="02020603050405020304" pitchFamily="18" charset="0"/>
                     </a:rPr>
-                    <a:t>E1</a:t>
+                    <a:t>A1</a:t>
                   </a:r>
-                  <a:endParaRPr lang="en-US" sz="1400" dirty="0">
+                  <a:endParaRPr lang="en-US" sz="1600" dirty="0">
                     <a:solidFill>
                       <a:schemeClr val="tx1"/>
                     </a:solidFill>
@@ -3831,7 +3832,7 @@
                 <a:p>
                   <a:pPr algn="ctr"/>
                   <a:r>
-                    <a:rPr lang="en-US" sz="1400" dirty="0">
+                    <a:rPr lang="en-US" sz="1600" dirty="0">
                       <a:solidFill>
                         <a:schemeClr val="tx1"/>
                       </a:solidFill>
@@ -3841,16 +3842,16 @@
                     <a:t>u</a:t>
                   </a:r>
                   <a:r>
-                    <a:rPr lang="en-US" sz="1400" baseline="-25000" dirty="0">
+                    <a:rPr lang="en-US" sz="1600" baseline="-25000" dirty="0">
                       <a:solidFill>
                         <a:schemeClr val="tx1"/>
                       </a:solidFill>
                       <a:latin typeface="Times New Roman" panose="02020603050405020304" pitchFamily="18" charset="0"/>
                       <a:cs typeface="Times New Roman" panose="02020603050405020304" pitchFamily="18" charset="0"/>
                     </a:rPr>
-                    <a:t>E3</a:t>
+                    <a:t>A3</a:t>
                   </a:r>
-                  <a:endParaRPr lang="en-US" sz="1400" dirty="0">
+                  <a:endParaRPr lang="en-US" sz="1600" dirty="0">
                     <a:solidFill>
                       <a:schemeClr val="tx1"/>
                     </a:solidFill>
@@ -3913,7 +3914,7 @@
                 <a:p>
                   <a:pPr algn="ctr"/>
                   <a:r>
-                    <a:rPr lang="en-US" sz="1400" dirty="0">
+                    <a:rPr lang="en-US" sz="1600" dirty="0">
                       <a:solidFill>
                         <a:schemeClr val="tx1"/>
                       </a:solidFill>
@@ -3923,16 +3924,16 @@
                     <a:t>u</a:t>
                   </a:r>
                   <a:r>
-                    <a:rPr lang="en-US" sz="1400" baseline="-25000" dirty="0">
+                    <a:rPr lang="en-US" sz="1600" baseline="-25000" dirty="0">
                       <a:solidFill>
                         <a:schemeClr val="tx1"/>
                       </a:solidFill>
                       <a:latin typeface="Times New Roman" panose="02020603050405020304" pitchFamily="18" charset="0"/>
                       <a:cs typeface="Times New Roman" panose="02020603050405020304" pitchFamily="18" charset="0"/>
                     </a:rPr>
-                    <a:t>E2</a:t>
+                    <a:t>A2</a:t>
                   </a:r>
-                  <a:endParaRPr lang="en-US" sz="1400" dirty="0">
+                  <a:endParaRPr lang="en-US" sz="1600" dirty="0">
                     <a:solidFill>
                       <a:schemeClr val="tx1"/>
                     </a:solidFill>
@@ -3998,14 +3999,14 @@
                 <a:p>
                   <a:pPr algn="ctr"/>
                   <a:r>
-                    <a:rPr lang="en-US" sz="1600" dirty="0">
+                    <a:rPr lang="en-US" dirty="0">
                       <a:solidFill>
                         <a:schemeClr val="tx1"/>
                       </a:solidFill>
                       <a:latin typeface="Times New Roman" panose="02020603050405020304" pitchFamily="18" charset="0"/>
                       <a:cs typeface="Times New Roman" panose="02020603050405020304" pitchFamily="18" charset="0"/>
                     </a:rPr>
-                    <a:t>E4</a:t>
+                    <a:t>A4</a:t>
                   </a:r>
                 </a:p>
               </p:txBody>
@@ -4066,14 +4067,14 @@
                 <a:p>
                   <a:pPr algn="ctr"/>
                   <a:r>
-                    <a:rPr lang="en-US" sz="1600" dirty="0">
+                    <a:rPr lang="en-US" dirty="0">
                       <a:solidFill>
                         <a:schemeClr val="tx1"/>
                       </a:solidFill>
                       <a:latin typeface="Times New Roman" panose="02020603050405020304" pitchFamily="18" charset="0"/>
                       <a:cs typeface="Times New Roman" panose="02020603050405020304" pitchFamily="18" charset="0"/>
                     </a:rPr>
-                    <a:t>E5</a:t>
+                    <a:t>A5</a:t>
                   </a:r>
                 </a:p>
               </p:txBody>
@@ -4131,7 +4132,7 @@
                 <a:p>
                   <a:pPr algn="ctr"/>
                   <a:r>
-                    <a:rPr lang="en-US" sz="1400" dirty="0">
+                    <a:rPr lang="en-US" sz="1600" dirty="0">
                       <a:solidFill>
                         <a:schemeClr val="tx1"/>
                       </a:solidFill>
@@ -4141,16 +4142,16 @@
                     <a:t>u</a:t>
                   </a:r>
                   <a:r>
-                    <a:rPr lang="en-US" sz="1400" baseline="-25000" dirty="0">
+                    <a:rPr lang="en-US" sz="1600" baseline="-25000" dirty="0">
                       <a:solidFill>
                         <a:schemeClr val="tx1"/>
                       </a:solidFill>
                       <a:latin typeface="Times New Roman" panose="02020603050405020304" pitchFamily="18" charset="0"/>
                       <a:cs typeface="Times New Roman" panose="02020603050405020304" pitchFamily="18" charset="0"/>
                     </a:rPr>
-                    <a:t>E5</a:t>
+                    <a:t>A5</a:t>
                   </a:r>
-                  <a:endParaRPr lang="en-US" sz="1400" dirty="0">
+                  <a:endParaRPr lang="en-US" sz="1600" dirty="0">
                     <a:solidFill>
                       <a:schemeClr val="tx1"/>
                     </a:solidFill>
@@ -4213,7 +4214,7 @@
                 <a:p>
                   <a:pPr algn="ctr"/>
                   <a:r>
-                    <a:rPr lang="en-US" sz="1400" dirty="0">
+                    <a:rPr lang="en-US" sz="1600" dirty="0">
                       <a:solidFill>
                         <a:schemeClr val="tx1"/>
                       </a:solidFill>
@@ -4223,16 +4224,16 @@
                     <a:t>u</a:t>
                   </a:r>
                   <a:r>
-                    <a:rPr lang="en-US" sz="1400" baseline="-25000" dirty="0">
+                    <a:rPr lang="en-US" sz="1600" baseline="-25000" dirty="0">
                       <a:solidFill>
                         <a:schemeClr val="tx1"/>
                       </a:solidFill>
                       <a:latin typeface="Times New Roman" panose="02020603050405020304" pitchFamily="18" charset="0"/>
                       <a:cs typeface="Times New Roman" panose="02020603050405020304" pitchFamily="18" charset="0"/>
                     </a:rPr>
-                    <a:t>E4</a:t>
+                    <a:t>A4</a:t>
                   </a:r>
-                  <a:endParaRPr lang="en-US" sz="1400" dirty="0">
+                  <a:endParaRPr lang="en-US" sz="1600" dirty="0">
                     <a:solidFill>
                       <a:schemeClr val="tx1"/>
                     </a:solidFill>
@@ -4733,7 +4734,7 @@
                 <a:p>
                   <a:pPr algn="ctr"/>
                   <a:r>
-                    <a:rPr lang="en-US" sz="1600" dirty="0">
+                    <a:rPr lang="en-US" dirty="0">
                       <a:solidFill>
                         <a:schemeClr val="tx1"/>
                       </a:solidFill>
@@ -4801,7 +4802,7 @@
                 <a:p>
                   <a:pPr algn="ctr"/>
                   <a:r>
-                    <a:rPr lang="en-US" sz="1600" dirty="0">
+                    <a:rPr lang="en-US" dirty="0">
                       <a:solidFill>
                         <a:schemeClr val="tx1"/>
                       </a:solidFill>
@@ -4869,7 +4870,7 @@
                 <a:p>
                   <a:pPr algn="ctr"/>
                   <a:r>
-                    <a:rPr lang="en-US" sz="1600" dirty="0">
+                    <a:rPr lang="en-US" dirty="0">
                       <a:solidFill>
                         <a:schemeClr val="tx1"/>
                       </a:solidFill>
@@ -4932,7 +4933,7 @@
                 <a:p>
                   <a:pPr algn="ctr"/>
                   <a:r>
-                    <a:rPr lang="en-US" sz="1600" dirty="0">
+                    <a:rPr lang="en-US" dirty="0">
                       <a:solidFill>
                         <a:schemeClr val="tx1"/>
                       </a:solidFill>
@@ -5043,7 +5044,7 @@
                 <a:p>
                   <a:pPr algn="ctr"/>
                   <a:r>
-                    <a:rPr lang="en-US" sz="1400" dirty="0">
+                    <a:rPr lang="en-US" sz="1600" dirty="0">
                       <a:solidFill>
                         <a:schemeClr val="tx1"/>
                       </a:solidFill>
@@ -5053,7 +5054,7 @@
                     <a:t>u</a:t>
                   </a:r>
                   <a:r>
-                    <a:rPr lang="en-US" sz="1400" baseline="-25000" dirty="0">
+                    <a:rPr lang="en-US" sz="1600" baseline="-25000" dirty="0">
                       <a:solidFill>
                         <a:schemeClr val="tx1"/>
                       </a:solidFill>
@@ -5062,7 +5063,7 @@
                     </a:rPr>
                     <a:t>O1</a:t>
                   </a:r>
-                  <a:endParaRPr lang="en-US" sz="1400" dirty="0">
+                  <a:endParaRPr lang="en-US" sz="1600" dirty="0">
                     <a:solidFill>
                       <a:schemeClr val="tx1"/>
                     </a:solidFill>
@@ -5125,7 +5126,7 @@
                 <a:p>
                   <a:pPr algn="ctr"/>
                   <a:r>
-                    <a:rPr lang="en-US" sz="1400" dirty="0">
+                    <a:rPr lang="en-US" sz="1600" dirty="0">
                       <a:solidFill>
                         <a:schemeClr val="tx1"/>
                       </a:solidFill>
@@ -5135,7 +5136,7 @@
                     <a:t>u</a:t>
                   </a:r>
                   <a:r>
-                    <a:rPr lang="en-US" sz="1400" baseline="-25000" dirty="0">
+                    <a:rPr lang="en-US" sz="1600" baseline="-25000" dirty="0">
                       <a:solidFill>
                         <a:schemeClr val="tx1"/>
                       </a:solidFill>
@@ -5144,7 +5145,7 @@
                     </a:rPr>
                     <a:t>O3</a:t>
                   </a:r>
-                  <a:endParaRPr lang="en-US" sz="1400" dirty="0">
+                  <a:endParaRPr lang="en-US" sz="1600" dirty="0">
                     <a:solidFill>
                       <a:schemeClr val="tx1"/>
                     </a:solidFill>
@@ -5207,7 +5208,7 @@
                 <a:p>
                   <a:pPr algn="ctr"/>
                   <a:r>
-                    <a:rPr lang="en-US" sz="1400" dirty="0">
+                    <a:rPr lang="en-US" sz="1600" dirty="0">
                       <a:solidFill>
                         <a:schemeClr val="tx1"/>
                       </a:solidFill>
@@ -5217,7 +5218,7 @@
                     <a:t>u</a:t>
                   </a:r>
                   <a:r>
-                    <a:rPr lang="en-US" sz="1400" baseline="-25000" dirty="0">
+                    <a:rPr lang="en-US" sz="1600" baseline="-25000" dirty="0">
                       <a:solidFill>
                         <a:schemeClr val="tx1"/>
                       </a:solidFill>
@@ -5226,7 +5227,7 @@
                     </a:rPr>
                     <a:t>O2</a:t>
                   </a:r>
-                  <a:endParaRPr lang="en-US" sz="1400" dirty="0">
+                  <a:endParaRPr lang="en-US" sz="1600" dirty="0">
                     <a:solidFill>
                       <a:schemeClr val="tx1"/>
                     </a:solidFill>
@@ -5292,7 +5293,7 @@
                 <a:p>
                   <a:pPr algn="ctr"/>
                   <a:r>
-                    <a:rPr lang="en-US" sz="1600" dirty="0">
+                    <a:rPr lang="en-US" dirty="0">
                       <a:solidFill>
                         <a:schemeClr val="tx1"/>
                       </a:solidFill>
@@ -5360,7 +5361,7 @@
                 <a:p>
                   <a:pPr algn="ctr"/>
                   <a:r>
-                    <a:rPr lang="en-US" sz="1600" dirty="0">
+                    <a:rPr lang="en-US" dirty="0">
                       <a:solidFill>
                         <a:schemeClr val="tx1"/>
                       </a:solidFill>
@@ -5425,7 +5426,7 @@
                 <a:p>
                   <a:pPr algn="ctr"/>
                   <a:r>
-                    <a:rPr lang="en-US" sz="1400" dirty="0">
+                    <a:rPr lang="en-US" sz="1600" dirty="0">
                       <a:solidFill>
                         <a:schemeClr val="tx1"/>
                       </a:solidFill>
@@ -5435,7 +5436,7 @@
                     <a:t>u</a:t>
                   </a:r>
                   <a:r>
-                    <a:rPr lang="en-US" sz="1400" baseline="-25000" dirty="0">
+                    <a:rPr lang="en-US" sz="1600" baseline="-25000" dirty="0">
                       <a:solidFill>
                         <a:schemeClr val="tx1"/>
                       </a:solidFill>
@@ -5444,7 +5445,7 @@
                     </a:rPr>
                     <a:t>O5</a:t>
                   </a:r>
-                  <a:endParaRPr lang="en-US" sz="1400" dirty="0">
+                  <a:endParaRPr lang="en-US" sz="1600" dirty="0">
                     <a:solidFill>
                       <a:schemeClr val="tx1"/>
                     </a:solidFill>
@@ -5507,7 +5508,7 @@
                 <a:p>
                   <a:pPr algn="ctr"/>
                   <a:r>
-                    <a:rPr lang="en-US" sz="1400" dirty="0">
+                    <a:rPr lang="en-US" sz="1600" dirty="0">
                       <a:solidFill>
                         <a:schemeClr val="tx1"/>
                       </a:solidFill>
@@ -5517,7 +5518,7 @@
                     <a:t>u</a:t>
                   </a:r>
                   <a:r>
-                    <a:rPr lang="en-US" sz="1400" baseline="-25000" dirty="0">
+                    <a:rPr lang="en-US" sz="1600" baseline="-25000" dirty="0">
                       <a:solidFill>
                         <a:schemeClr val="tx1"/>
                       </a:solidFill>
@@ -5526,7 +5527,7 @@
                     </a:rPr>
                     <a:t>O4</a:t>
                   </a:r>
-                  <a:endParaRPr lang="en-US" sz="1400" dirty="0">
+                  <a:endParaRPr lang="en-US" sz="1600" dirty="0">
                     <a:solidFill>
                       <a:schemeClr val="tx1"/>
                     </a:solidFill>
@@ -6059,14 +6060,14 @@
             <a:p>
               <a:pPr algn="ctr"/>
               <a:r>
-                <a:rPr lang="en-US" sz="1600" dirty="0">
+                <a:rPr lang="en-US" dirty="0">
                   <a:solidFill>
                     <a:schemeClr val="tx1"/>
                   </a:solidFill>
                   <a:latin typeface="Times New Roman" panose="02020603050405020304" pitchFamily="18" charset="0"/>
                   <a:cs typeface="Times New Roman" panose="02020603050405020304" pitchFamily="18" charset="0"/>
                 </a:rPr>
-                <a:t>Income</a:t>
+                <a:t>Male</a:t>
               </a:r>
             </a:p>
           </p:txBody>
@@ -6129,7 +6130,7 @@
             <a:p>
               <a:pPr algn="ctr"/>
               <a:r>
-                <a:rPr lang="en-US" sz="1600" dirty="0">
+                <a:rPr lang="en-US" dirty="0">
                   <a:solidFill>
                     <a:schemeClr val="tx1"/>
                   </a:solidFill>
@@ -7148,6 +7149,3764 @@
 </p:sld>
 </file>
 
+<file path=ppt/slides/slide2.xml><?xml version="1.0" encoding="utf-8"?>
+<p:sld xmlns:a="http://schemas.openxmlformats.org/drawingml/2006/main" xmlns:r="http://schemas.openxmlformats.org/officeDocument/2006/relationships" xmlns:p="http://schemas.openxmlformats.org/presentationml/2006/main">
+  <p:cSld>
+    <p:spTree>
+      <p:nvGrpSpPr>
+        <p:cNvPr id="1" name=""/>
+        <p:cNvGrpSpPr/>
+        <p:nvPr/>
+      </p:nvGrpSpPr>
+      <p:grpSpPr>
+        <a:xfrm>
+          <a:off x="0" y="0"/>
+          <a:ext cx="0" cy="0"/>
+          <a:chOff x="0" y="0"/>
+          <a:chExt cx="0" cy="0"/>
+        </a:xfrm>
+      </p:grpSpPr>
+      <p:sp>
+        <p:nvSpPr>
+          <p:cNvPr id="88" name="Rectangle 87">
+            <a:extLst>
+              <a:ext uri="{FF2B5EF4-FFF2-40B4-BE49-F238E27FC236}">
+                <a16:creationId xmlns:a16="http://schemas.microsoft.com/office/drawing/2014/main" id="{9721BF25-5F46-4E94-B8B0-EF76B1988557}"/>
+              </a:ext>
+            </a:extLst>
+          </p:cNvPr>
+          <p:cNvSpPr/>
+          <p:nvPr/>
+        </p:nvSpPr>
+        <p:spPr>
+          <a:xfrm>
+            <a:off x="6339400" y="719881"/>
+            <a:ext cx="765907" cy="749885"/>
+          </a:xfrm>
+          <a:prstGeom prst="rect">
+            <a:avLst/>
+          </a:prstGeom>
+          <a:solidFill>
+            <a:schemeClr val="bg1"/>
+          </a:solidFill>
+          <a:ln w="19050">
+            <a:solidFill>
+              <a:schemeClr val="tx1"/>
+            </a:solidFill>
+          </a:ln>
+        </p:spPr>
+        <p:style>
+          <a:lnRef idx="2">
+            <a:schemeClr val="accent1">
+              <a:shade val="50000"/>
+            </a:schemeClr>
+          </a:lnRef>
+          <a:fillRef idx="1">
+            <a:schemeClr val="accent1"/>
+          </a:fillRef>
+          <a:effectRef idx="0">
+            <a:schemeClr val="accent1"/>
+          </a:effectRef>
+          <a:fontRef idx="minor">
+            <a:schemeClr val="lt1"/>
+          </a:fontRef>
+        </p:style>
+        <p:txBody>
+          <a:bodyPr rot="0" spcFirstLastPara="0" vertOverflow="overflow" horzOverflow="overflow" vert="horz" wrap="square" lIns="53996" tIns="26998" rIns="53996" bIns="26998" numCol="1" spcCol="0" rtlCol="0" fromWordArt="0" anchor="ctr" anchorCtr="0" forceAA="0" compatLnSpc="1">
+            <a:prstTxWarp prst="textNoShape">
+              <a:avLst/>
+            </a:prstTxWarp>
+            <a:noAutofit/>
+          </a:bodyPr>
+          <a:lstStyle/>
+          <a:p>
+            <a:pPr algn="ctr"/>
+            <a:r>
+              <a:rPr lang="en-US" sz="1600" dirty="0">
+                <a:solidFill>
+                  <a:schemeClr val="tx1"/>
+                </a:solidFill>
+                <a:latin typeface="Times New Roman" panose="02020603050405020304" pitchFamily="18" charset="0"/>
+                <a:cs typeface="Times New Roman" panose="02020603050405020304" pitchFamily="18" charset="0"/>
+              </a:rPr>
+              <a:t>E1</a:t>
+            </a:r>
+          </a:p>
+        </p:txBody>
+      </p:sp>
+      <p:sp>
+        <p:nvSpPr>
+          <p:cNvPr id="89" name="Rectangle 88">
+            <a:extLst>
+              <a:ext uri="{FF2B5EF4-FFF2-40B4-BE49-F238E27FC236}">
+                <a16:creationId xmlns:a16="http://schemas.microsoft.com/office/drawing/2014/main" id="{506AC8EB-765F-4D24-896E-D49C57559D7F}"/>
+              </a:ext>
+            </a:extLst>
+          </p:cNvPr>
+          <p:cNvSpPr/>
+          <p:nvPr/>
+        </p:nvSpPr>
+        <p:spPr>
+          <a:xfrm>
+            <a:off x="6339400" y="1594633"/>
+            <a:ext cx="765907" cy="749885"/>
+          </a:xfrm>
+          <a:prstGeom prst="rect">
+            <a:avLst/>
+          </a:prstGeom>
+          <a:solidFill>
+            <a:schemeClr val="bg1"/>
+          </a:solidFill>
+          <a:ln w="19050">
+            <a:solidFill>
+              <a:schemeClr val="tx1"/>
+            </a:solidFill>
+          </a:ln>
+        </p:spPr>
+        <p:style>
+          <a:lnRef idx="2">
+            <a:schemeClr val="accent1">
+              <a:shade val="50000"/>
+            </a:schemeClr>
+          </a:lnRef>
+          <a:fillRef idx="1">
+            <a:schemeClr val="accent1"/>
+          </a:fillRef>
+          <a:effectRef idx="0">
+            <a:schemeClr val="accent1"/>
+          </a:effectRef>
+          <a:fontRef idx="minor">
+            <a:schemeClr val="lt1"/>
+          </a:fontRef>
+        </p:style>
+        <p:txBody>
+          <a:bodyPr rot="0" spcFirstLastPara="0" vertOverflow="overflow" horzOverflow="overflow" vert="horz" wrap="square" lIns="53996" tIns="26998" rIns="53996" bIns="26998" numCol="1" spcCol="0" rtlCol="0" fromWordArt="0" anchor="ctr" anchorCtr="0" forceAA="0" compatLnSpc="1">
+            <a:prstTxWarp prst="textNoShape">
+              <a:avLst/>
+            </a:prstTxWarp>
+            <a:noAutofit/>
+          </a:bodyPr>
+          <a:lstStyle/>
+          <a:p>
+            <a:pPr algn="ctr"/>
+            <a:r>
+              <a:rPr lang="en-US" sz="1600" dirty="0">
+                <a:solidFill>
+                  <a:schemeClr val="tx1"/>
+                </a:solidFill>
+                <a:latin typeface="Times New Roman" panose="02020603050405020304" pitchFamily="18" charset="0"/>
+                <a:cs typeface="Times New Roman" panose="02020603050405020304" pitchFamily="18" charset="0"/>
+              </a:rPr>
+              <a:t>E2</a:t>
+            </a:r>
+          </a:p>
+        </p:txBody>
+      </p:sp>
+      <p:sp>
+        <p:nvSpPr>
+          <p:cNvPr id="90" name="Rectangle 89">
+            <a:extLst>
+              <a:ext uri="{FF2B5EF4-FFF2-40B4-BE49-F238E27FC236}">
+                <a16:creationId xmlns:a16="http://schemas.microsoft.com/office/drawing/2014/main" id="{E3A41356-9924-48B5-A729-992CB541C149}"/>
+              </a:ext>
+            </a:extLst>
+          </p:cNvPr>
+          <p:cNvSpPr/>
+          <p:nvPr/>
+        </p:nvSpPr>
+        <p:spPr>
+          <a:xfrm>
+            <a:off x="6339398" y="2468474"/>
+            <a:ext cx="765907" cy="749885"/>
+          </a:xfrm>
+          <a:prstGeom prst="rect">
+            <a:avLst/>
+          </a:prstGeom>
+          <a:solidFill>
+            <a:schemeClr val="bg1"/>
+          </a:solidFill>
+          <a:ln w="19050">
+            <a:solidFill>
+              <a:schemeClr val="tx1"/>
+            </a:solidFill>
+          </a:ln>
+        </p:spPr>
+        <p:style>
+          <a:lnRef idx="2">
+            <a:schemeClr val="accent1">
+              <a:shade val="50000"/>
+            </a:schemeClr>
+          </a:lnRef>
+          <a:fillRef idx="1">
+            <a:schemeClr val="accent1"/>
+          </a:fillRef>
+          <a:effectRef idx="0">
+            <a:schemeClr val="accent1"/>
+          </a:effectRef>
+          <a:fontRef idx="minor">
+            <a:schemeClr val="lt1"/>
+          </a:fontRef>
+        </p:style>
+        <p:txBody>
+          <a:bodyPr rot="0" spcFirstLastPara="0" vertOverflow="overflow" horzOverflow="overflow" vert="horz" wrap="square" lIns="53996" tIns="26998" rIns="53996" bIns="26998" numCol="1" spcCol="0" rtlCol="0" fromWordArt="0" anchor="ctr" anchorCtr="0" forceAA="0" compatLnSpc="1">
+            <a:prstTxWarp prst="textNoShape">
+              <a:avLst/>
+            </a:prstTxWarp>
+            <a:noAutofit/>
+          </a:bodyPr>
+          <a:lstStyle/>
+          <a:p>
+            <a:pPr algn="ctr"/>
+            <a:r>
+              <a:rPr lang="en-US" sz="1600" dirty="0">
+                <a:solidFill>
+                  <a:schemeClr val="tx1"/>
+                </a:solidFill>
+                <a:latin typeface="Times New Roman" panose="02020603050405020304" pitchFamily="18" charset="0"/>
+                <a:cs typeface="Times New Roman" panose="02020603050405020304" pitchFamily="18" charset="0"/>
+              </a:rPr>
+              <a:t>E3</a:t>
+            </a:r>
+          </a:p>
+        </p:txBody>
+      </p:sp>
+      <p:sp>
+        <p:nvSpPr>
+          <p:cNvPr id="91" name="Oval 90">
+            <a:extLst>
+              <a:ext uri="{FF2B5EF4-FFF2-40B4-BE49-F238E27FC236}">
+                <a16:creationId xmlns:a16="http://schemas.microsoft.com/office/drawing/2014/main" id="{EDC4E5B4-422E-4761-8ABB-5ED3E84357EF}"/>
+              </a:ext>
+            </a:extLst>
+          </p:cNvPr>
+          <p:cNvSpPr/>
+          <p:nvPr/>
+        </p:nvSpPr>
+        <p:spPr>
+          <a:xfrm>
+            <a:off x="7844667" y="2040978"/>
+            <a:ext cx="1634140" cy="1599952"/>
+          </a:xfrm>
+          <a:prstGeom prst="ellipse">
+            <a:avLst/>
+          </a:prstGeom>
+          <a:solidFill>
+            <a:schemeClr val="bg1"/>
+          </a:solidFill>
+          <a:ln w="19050">
+            <a:solidFill>
+              <a:schemeClr val="tx1"/>
+            </a:solidFill>
+          </a:ln>
+        </p:spPr>
+        <p:style>
+          <a:lnRef idx="2">
+            <a:schemeClr val="accent1">
+              <a:shade val="50000"/>
+            </a:schemeClr>
+          </a:lnRef>
+          <a:fillRef idx="1">
+            <a:schemeClr val="accent1"/>
+          </a:fillRef>
+          <a:effectRef idx="0">
+            <a:schemeClr val="accent1"/>
+          </a:effectRef>
+          <a:fontRef idx="minor">
+            <a:schemeClr val="lt1"/>
+          </a:fontRef>
+        </p:style>
+        <p:txBody>
+          <a:bodyPr lIns="0" rIns="0" rtlCol="0" anchor="ctr"/>
+          <a:lstStyle/>
+          <a:p>
+            <a:pPr algn="ctr"/>
+            <a:r>
+              <a:rPr lang="en-US" sz="1600" dirty="0">
+                <a:solidFill>
+                  <a:schemeClr val="tx1"/>
+                </a:solidFill>
+                <a:latin typeface="Times New Roman" panose="02020603050405020304" pitchFamily="18" charset="0"/>
+                <a:cs typeface="Times New Roman" panose="02020603050405020304" pitchFamily="18" charset="0"/>
+              </a:rPr>
+              <a:t>Extraversion</a:t>
+            </a:r>
+          </a:p>
+        </p:txBody>
+      </p:sp>
+      <p:cxnSp>
+        <p:nvCxnSpPr>
+          <p:cNvPr id="92" name="Straight Arrow Connector 91">
+            <a:extLst>
+              <a:ext uri="{FF2B5EF4-FFF2-40B4-BE49-F238E27FC236}">
+                <a16:creationId xmlns:a16="http://schemas.microsoft.com/office/drawing/2014/main" id="{A0171EDF-6F98-4773-A690-45B98A5726EB}"/>
+              </a:ext>
+            </a:extLst>
+          </p:cNvPr>
+          <p:cNvCxnSpPr>
+            <a:cxnSpLocks/>
+            <a:stCxn id="91" idx="2"/>
+            <a:endCxn id="88" idx="3"/>
+          </p:cNvCxnSpPr>
+          <p:nvPr/>
+        </p:nvCxnSpPr>
+        <p:spPr>
+          <a:xfrm flipH="1" flipV="1">
+            <a:off x="7105306" y="1094824"/>
+            <a:ext cx="739361" cy="1746130"/>
+          </a:xfrm>
+          <a:prstGeom prst="straightConnector1">
+            <a:avLst/>
+          </a:prstGeom>
+          <a:ln w="19050">
+            <a:solidFill>
+              <a:schemeClr val="tx1"/>
+            </a:solidFill>
+            <a:tailEnd type="triangle"/>
+          </a:ln>
+        </p:spPr>
+        <p:style>
+          <a:lnRef idx="1">
+            <a:schemeClr val="accent1"/>
+          </a:lnRef>
+          <a:fillRef idx="0">
+            <a:schemeClr val="accent1"/>
+          </a:fillRef>
+          <a:effectRef idx="0">
+            <a:schemeClr val="accent1"/>
+          </a:effectRef>
+          <a:fontRef idx="minor">
+            <a:schemeClr val="tx1"/>
+          </a:fontRef>
+        </p:style>
+      </p:cxnSp>
+      <p:sp>
+        <p:nvSpPr>
+          <p:cNvPr id="95" name="Oval 94">
+            <a:extLst>
+              <a:ext uri="{FF2B5EF4-FFF2-40B4-BE49-F238E27FC236}">
+                <a16:creationId xmlns:a16="http://schemas.microsoft.com/office/drawing/2014/main" id="{35EA1314-289C-4D2F-8F74-3E6BB0DC24DE}"/>
+              </a:ext>
+            </a:extLst>
+          </p:cNvPr>
+          <p:cNvSpPr>
+            <a:spLocks noChangeAspect="1"/>
+          </p:cNvSpPr>
+          <p:nvPr/>
+        </p:nvSpPr>
+        <p:spPr>
+          <a:xfrm>
+            <a:off x="5295602" y="757549"/>
+            <a:ext cx="680891" cy="666648"/>
+          </a:xfrm>
+          <a:prstGeom prst="ellipse">
+            <a:avLst/>
+          </a:prstGeom>
+          <a:solidFill>
+            <a:schemeClr val="bg1"/>
+          </a:solidFill>
+          <a:ln w="19050">
+            <a:solidFill>
+              <a:schemeClr val="tx1"/>
+            </a:solidFill>
+          </a:ln>
+        </p:spPr>
+        <p:style>
+          <a:lnRef idx="2">
+            <a:schemeClr val="accent1">
+              <a:shade val="50000"/>
+            </a:schemeClr>
+          </a:lnRef>
+          <a:fillRef idx="1">
+            <a:schemeClr val="accent1"/>
+          </a:fillRef>
+          <a:effectRef idx="0">
+            <a:schemeClr val="accent1"/>
+          </a:effectRef>
+          <a:fontRef idx="minor">
+            <a:schemeClr val="lt1"/>
+          </a:fontRef>
+        </p:style>
+        <p:txBody>
+          <a:bodyPr rtlCol="0" anchor="ctr"/>
+          <a:lstStyle/>
+          <a:p>
+            <a:pPr algn="ctr"/>
+            <a:r>
+              <a:rPr lang="en-US" sz="1400" dirty="0">
+                <a:solidFill>
+                  <a:schemeClr val="tx1"/>
+                </a:solidFill>
+                <a:latin typeface="Times New Roman" panose="02020603050405020304" pitchFamily="18" charset="0"/>
+                <a:cs typeface="Times New Roman" panose="02020603050405020304" pitchFamily="18" charset="0"/>
+              </a:rPr>
+              <a:t>u</a:t>
+            </a:r>
+            <a:r>
+              <a:rPr lang="en-US" sz="1400" baseline="-25000" dirty="0">
+                <a:solidFill>
+                  <a:schemeClr val="tx1"/>
+                </a:solidFill>
+                <a:latin typeface="Times New Roman" panose="02020603050405020304" pitchFamily="18" charset="0"/>
+                <a:cs typeface="Times New Roman" panose="02020603050405020304" pitchFamily="18" charset="0"/>
+              </a:rPr>
+              <a:t>E1</a:t>
+            </a:r>
+            <a:endParaRPr lang="en-US" sz="1400" dirty="0">
+              <a:solidFill>
+                <a:schemeClr val="tx1"/>
+              </a:solidFill>
+              <a:latin typeface="Times New Roman" panose="02020603050405020304" pitchFamily="18" charset="0"/>
+              <a:cs typeface="Times New Roman" panose="02020603050405020304" pitchFamily="18" charset="0"/>
+            </a:endParaRPr>
+          </a:p>
+        </p:txBody>
+      </p:sp>
+      <p:sp>
+        <p:nvSpPr>
+          <p:cNvPr id="97" name="Oval 96">
+            <a:extLst>
+              <a:ext uri="{FF2B5EF4-FFF2-40B4-BE49-F238E27FC236}">
+                <a16:creationId xmlns:a16="http://schemas.microsoft.com/office/drawing/2014/main" id="{9B593B06-2B59-4763-810B-EBCE3E14BAC9}"/>
+              </a:ext>
+            </a:extLst>
+          </p:cNvPr>
+          <p:cNvSpPr>
+            <a:spLocks noChangeAspect="1"/>
+          </p:cNvSpPr>
+          <p:nvPr/>
+        </p:nvSpPr>
+        <p:spPr>
+          <a:xfrm>
+            <a:off x="5291016" y="2507631"/>
+            <a:ext cx="680891" cy="666648"/>
+          </a:xfrm>
+          <a:prstGeom prst="ellipse">
+            <a:avLst/>
+          </a:prstGeom>
+          <a:solidFill>
+            <a:schemeClr val="bg1"/>
+          </a:solidFill>
+          <a:ln w="19050">
+            <a:solidFill>
+              <a:schemeClr val="tx1"/>
+            </a:solidFill>
+          </a:ln>
+        </p:spPr>
+        <p:style>
+          <a:lnRef idx="2">
+            <a:schemeClr val="accent1">
+              <a:shade val="50000"/>
+            </a:schemeClr>
+          </a:lnRef>
+          <a:fillRef idx="1">
+            <a:schemeClr val="accent1"/>
+          </a:fillRef>
+          <a:effectRef idx="0">
+            <a:schemeClr val="accent1"/>
+          </a:effectRef>
+          <a:fontRef idx="minor">
+            <a:schemeClr val="lt1"/>
+          </a:fontRef>
+        </p:style>
+        <p:txBody>
+          <a:bodyPr rtlCol="0" anchor="ctr"/>
+          <a:lstStyle/>
+          <a:p>
+            <a:pPr algn="ctr"/>
+            <a:r>
+              <a:rPr lang="en-US" sz="1400" dirty="0">
+                <a:solidFill>
+                  <a:schemeClr val="tx1"/>
+                </a:solidFill>
+                <a:latin typeface="Times New Roman" panose="02020603050405020304" pitchFamily="18" charset="0"/>
+                <a:cs typeface="Times New Roman" panose="02020603050405020304" pitchFamily="18" charset="0"/>
+              </a:rPr>
+              <a:t>u</a:t>
+            </a:r>
+            <a:r>
+              <a:rPr lang="en-US" sz="1400" baseline="-25000" dirty="0">
+                <a:solidFill>
+                  <a:schemeClr val="tx1"/>
+                </a:solidFill>
+                <a:latin typeface="Times New Roman" panose="02020603050405020304" pitchFamily="18" charset="0"/>
+                <a:cs typeface="Times New Roman" panose="02020603050405020304" pitchFamily="18" charset="0"/>
+              </a:rPr>
+              <a:t>E3</a:t>
+            </a:r>
+            <a:endParaRPr lang="en-US" sz="1400" dirty="0">
+              <a:solidFill>
+                <a:schemeClr val="tx1"/>
+              </a:solidFill>
+              <a:latin typeface="Times New Roman" panose="02020603050405020304" pitchFamily="18" charset="0"/>
+              <a:cs typeface="Times New Roman" panose="02020603050405020304" pitchFamily="18" charset="0"/>
+            </a:endParaRPr>
+          </a:p>
+        </p:txBody>
+      </p:sp>
+      <p:sp>
+        <p:nvSpPr>
+          <p:cNvPr id="99" name="Oval 98">
+            <a:extLst>
+              <a:ext uri="{FF2B5EF4-FFF2-40B4-BE49-F238E27FC236}">
+                <a16:creationId xmlns:a16="http://schemas.microsoft.com/office/drawing/2014/main" id="{DFA599F2-A25D-45CE-A0EE-495307342486}"/>
+              </a:ext>
+            </a:extLst>
+          </p:cNvPr>
+          <p:cNvSpPr>
+            <a:spLocks noChangeAspect="1"/>
+          </p:cNvSpPr>
+          <p:nvPr/>
+        </p:nvSpPr>
+        <p:spPr>
+          <a:xfrm>
+            <a:off x="5295602" y="1641911"/>
+            <a:ext cx="680891" cy="666648"/>
+          </a:xfrm>
+          <a:prstGeom prst="ellipse">
+            <a:avLst/>
+          </a:prstGeom>
+          <a:solidFill>
+            <a:schemeClr val="bg1"/>
+          </a:solidFill>
+          <a:ln w="19050">
+            <a:solidFill>
+              <a:schemeClr val="tx1"/>
+            </a:solidFill>
+          </a:ln>
+        </p:spPr>
+        <p:style>
+          <a:lnRef idx="2">
+            <a:schemeClr val="accent1">
+              <a:shade val="50000"/>
+            </a:schemeClr>
+          </a:lnRef>
+          <a:fillRef idx="1">
+            <a:schemeClr val="accent1"/>
+          </a:fillRef>
+          <a:effectRef idx="0">
+            <a:schemeClr val="accent1"/>
+          </a:effectRef>
+          <a:fontRef idx="minor">
+            <a:schemeClr val="lt1"/>
+          </a:fontRef>
+        </p:style>
+        <p:txBody>
+          <a:bodyPr rtlCol="0" anchor="ctr"/>
+          <a:lstStyle/>
+          <a:p>
+            <a:pPr algn="ctr"/>
+            <a:r>
+              <a:rPr lang="en-US" sz="1400" dirty="0">
+                <a:solidFill>
+                  <a:schemeClr val="tx1"/>
+                </a:solidFill>
+                <a:latin typeface="Times New Roman" panose="02020603050405020304" pitchFamily="18" charset="0"/>
+                <a:cs typeface="Times New Roman" panose="02020603050405020304" pitchFamily="18" charset="0"/>
+              </a:rPr>
+              <a:t>u</a:t>
+            </a:r>
+            <a:r>
+              <a:rPr lang="en-US" sz="1400" baseline="-25000" dirty="0">
+                <a:solidFill>
+                  <a:schemeClr val="tx1"/>
+                </a:solidFill>
+                <a:latin typeface="Times New Roman" panose="02020603050405020304" pitchFamily="18" charset="0"/>
+                <a:cs typeface="Times New Roman" panose="02020603050405020304" pitchFamily="18" charset="0"/>
+              </a:rPr>
+              <a:t>E2</a:t>
+            </a:r>
+            <a:endParaRPr lang="en-US" sz="1400" dirty="0">
+              <a:solidFill>
+                <a:schemeClr val="tx1"/>
+              </a:solidFill>
+              <a:latin typeface="Times New Roman" panose="02020603050405020304" pitchFamily="18" charset="0"/>
+              <a:cs typeface="Times New Roman" panose="02020603050405020304" pitchFamily="18" charset="0"/>
+            </a:endParaRPr>
+          </a:p>
+        </p:txBody>
+      </p:sp>
+      <p:sp>
+        <p:nvSpPr>
+          <p:cNvPr id="101" name="Rectangle 100">
+            <a:extLst>
+              <a:ext uri="{FF2B5EF4-FFF2-40B4-BE49-F238E27FC236}">
+                <a16:creationId xmlns:a16="http://schemas.microsoft.com/office/drawing/2014/main" id="{C10B8797-E892-4D91-9D75-B1116B1B0056}"/>
+              </a:ext>
+            </a:extLst>
+          </p:cNvPr>
+          <p:cNvSpPr/>
+          <p:nvPr/>
+        </p:nvSpPr>
+        <p:spPr>
+          <a:xfrm>
+            <a:off x="6343941" y="3342316"/>
+            <a:ext cx="765907" cy="749885"/>
+          </a:xfrm>
+          <a:prstGeom prst="rect">
+            <a:avLst/>
+          </a:prstGeom>
+          <a:solidFill>
+            <a:schemeClr val="bg1"/>
+          </a:solidFill>
+          <a:ln w="19050">
+            <a:solidFill>
+              <a:schemeClr val="tx1"/>
+            </a:solidFill>
+          </a:ln>
+        </p:spPr>
+        <p:style>
+          <a:lnRef idx="2">
+            <a:schemeClr val="accent1">
+              <a:shade val="50000"/>
+            </a:schemeClr>
+          </a:lnRef>
+          <a:fillRef idx="1">
+            <a:schemeClr val="accent1"/>
+          </a:fillRef>
+          <a:effectRef idx="0">
+            <a:schemeClr val="accent1"/>
+          </a:effectRef>
+          <a:fontRef idx="minor">
+            <a:schemeClr val="lt1"/>
+          </a:fontRef>
+        </p:style>
+        <p:txBody>
+          <a:bodyPr rot="0" spcFirstLastPara="0" vertOverflow="overflow" horzOverflow="overflow" vert="horz" wrap="square" lIns="53996" tIns="26998" rIns="53996" bIns="26998" numCol="1" spcCol="0" rtlCol="0" fromWordArt="0" anchor="ctr" anchorCtr="0" forceAA="0" compatLnSpc="1">
+            <a:prstTxWarp prst="textNoShape">
+              <a:avLst/>
+            </a:prstTxWarp>
+            <a:noAutofit/>
+          </a:bodyPr>
+          <a:lstStyle/>
+          <a:p>
+            <a:pPr algn="ctr"/>
+            <a:r>
+              <a:rPr lang="en-US" sz="1600" dirty="0">
+                <a:solidFill>
+                  <a:schemeClr val="tx1"/>
+                </a:solidFill>
+                <a:latin typeface="Times New Roman" panose="02020603050405020304" pitchFamily="18" charset="0"/>
+                <a:cs typeface="Times New Roman" panose="02020603050405020304" pitchFamily="18" charset="0"/>
+              </a:rPr>
+              <a:t>E4</a:t>
+            </a:r>
+          </a:p>
+        </p:txBody>
+      </p:sp>
+      <p:sp>
+        <p:nvSpPr>
+          <p:cNvPr id="104" name="Rectangle 103">
+            <a:extLst>
+              <a:ext uri="{FF2B5EF4-FFF2-40B4-BE49-F238E27FC236}">
+                <a16:creationId xmlns:a16="http://schemas.microsoft.com/office/drawing/2014/main" id="{08BF1AD6-3D8B-4F9A-BE80-B091989E668D}"/>
+              </a:ext>
+            </a:extLst>
+          </p:cNvPr>
+          <p:cNvSpPr/>
+          <p:nvPr/>
+        </p:nvSpPr>
+        <p:spPr>
+          <a:xfrm>
+            <a:off x="6348048" y="4234914"/>
+            <a:ext cx="765907" cy="749885"/>
+          </a:xfrm>
+          <a:prstGeom prst="rect">
+            <a:avLst/>
+          </a:prstGeom>
+          <a:solidFill>
+            <a:schemeClr val="bg1"/>
+          </a:solidFill>
+          <a:ln w="19050">
+            <a:solidFill>
+              <a:schemeClr val="tx1"/>
+            </a:solidFill>
+          </a:ln>
+        </p:spPr>
+        <p:style>
+          <a:lnRef idx="2">
+            <a:schemeClr val="accent1">
+              <a:shade val="50000"/>
+            </a:schemeClr>
+          </a:lnRef>
+          <a:fillRef idx="1">
+            <a:schemeClr val="accent1"/>
+          </a:fillRef>
+          <a:effectRef idx="0">
+            <a:schemeClr val="accent1"/>
+          </a:effectRef>
+          <a:fontRef idx="minor">
+            <a:schemeClr val="lt1"/>
+          </a:fontRef>
+        </p:style>
+        <p:txBody>
+          <a:bodyPr rot="0" spcFirstLastPara="0" vertOverflow="overflow" horzOverflow="overflow" vert="horz" wrap="square" lIns="53996" tIns="26998" rIns="53996" bIns="26998" numCol="1" spcCol="0" rtlCol="0" fromWordArt="0" anchor="ctr" anchorCtr="0" forceAA="0" compatLnSpc="1">
+            <a:prstTxWarp prst="textNoShape">
+              <a:avLst/>
+            </a:prstTxWarp>
+            <a:noAutofit/>
+          </a:bodyPr>
+          <a:lstStyle/>
+          <a:p>
+            <a:pPr algn="ctr"/>
+            <a:r>
+              <a:rPr lang="en-US" sz="1600" dirty="0">
+                <a:solidFill>
+                  <a:schemeClr val="tx1"/>
+                </a:solidFill>
+                <a:latin typeface="Times New Roman" panose="02020603050405020304" pitchFamily="18" charset="0"/>
+                <a:cs typeface="Times New Roman" panose="02020603050405020304" pitchFamily="18" charset="0"/>
+              </a:rPr>
+              <a:t>E5</a:t>
+            </a:r>
+          </a:p>
+        </p:txBody>
+      </p:sp>
+      <p:sp>
+        <p:nvSpPr>
+          <p:cNvPr id="109" name="Oval 108">
+            <a:extLst>
+              <a:ext uri="{FF2B5EF4-FFF2-40B4-BE49-F238E27FC236}">
+                <a16:creationId xmlns:a16="http://schemas.microsoft.com/office/drawing/2014/main" id="{EFA5A4D4-5CBE-4E3C-A87F-1AAEA286F5D8}"/>
+              </a:ext>
+            </a:extLst>
+          </p:cNvPr>
+          <p:cNvSpPr>
+            <a:spLocks noChangeAspect="1"/>
+          </p:cNvSpPr>
+          <p:nvPr/>
+        </p:nvSpPr>
+        <p:spPr>
+          <a:xfrm>
+            <a:off x="5291016" y="4283884"/>
+            <a:ext cx="680891" cy="666648"/>
+          </a:xfrm>
+          <a:prstGeom prst="ellipse">
+            <a:avLst/>
+          </a:prstGeom>
+          <a:solidFill>
+            <a:schemeClr val="bg1"/>
+          </a:solidFill>
+          <a:ln w="19050">
+            <a:solidFill>
+              <a:schemeClr val="tx1"/>
+            </a:solidFill>
+          </a:ln>
+        </p:spPr>
+        <p:style>
+          <a:lnRef idx="2">
+            <a:schemeClr val="accent1">
+              <a:shade val="50000"/>
+            </a:schemeClr>
+          </a:lnRef>
+          <a:fillRef idx="1">
+            <a:schemeClr val="accent1"/>
+          </a:fillRef>
+          <a:effectRef idx="0">
+            <a:schemeClr val="accent1"/>
+          </a:effectRef>
+          <a:fontRef idx="minor">
+            <a:schemeClr val="lt1"/>
+          </a:fontRef>
+        </p:style>
+        <p:txBody>
+          <a:bodyPr rtlCol="0" anchor="ctr"/>
+          <a:lstStyle/>
+          <a:p>
+            <a:pPr algn="ctr"/>
+            <a:r>
+              <a:rPr lang="en-US" sz="1400" dirty="0">
+                <a:solidFill>
+                  <a:schemeClr val="tx1"/>
+                </a:solidFill>
+                <a:latin typeface="Times New Roman" panose="02020603050405020304" pitchFamily="18" charset="0"/>
+                <a:cs typeface="Times New Roman" panose="02020603050405020304" pitchFamily="18" charset="0"/>
+              </a:rPr>
+              <a:t>u</a:t>
+            </a:r>
+            <a:r>
+              <a:rPr lang="en-US" sz="1400" baseline="-25000" dirty="0">
+                <a:solidFill>
+                  <a:schemeClr val="tx1"/>
+                </a:solidFill>
+                <a:latin typeface="Times New Roman" panose="02020603050405020304" pitchFamily="18" charset="0"/>
+                <a:cs typeface="Times New Roman" panose="02020603050405020304" pitchFamily="18" charset="0"/>
+              </a:rPr>
+              <a:t>E5</a:t>
+            </a:r>
+            <a:endParaRPr lang="en-US" sz="1400" dirty="0">
+              <a:solidFill>
+                <a:schemeClr val="tx1"/>
+              </a:solidFill>
+              <a:latin typeface="Times New Roman" panose="02020603050405020304" pitchFamily="18" charset="0"/>
+              <a:cs typeface="Times New Roman" panose="02020603050405020304" pitchFamily="18" charset="0"/>
+            </a:endParaRPr>
+          </a:p>
+        </p:txBody>
+      </p:sp>
+      <p:sp>
+        <p:nvSpPr>
+          <p:cNvPr id="112" name="Oval 111">
+            <a:extLst>
+              <a:ext uri="{FF2B5EF4-FFF2-40B4-BE49-F238E27FC236}">
+                <a16:creationId xmlns:a16="http://schemas.microsoft.com/office/drawing/2014/main" id="{48E12B9D-E4BB-4B79-A82D-774A5420962F}"/>
+              </a:ext>
+            </a:extLst>
+          </p:cNvPr>
+          <p:cNvSpPr>
+            <a:spLocks noChangeAspect="1"/>
+          </p:cNvSpPr>
+          <p:nvPr/>
+        </p:nvSpPr>
+        <p:spPr>
+          <a:xfrm>
+            <a:off x="5295602" y="3377799"/>
+            <a:ext cx="680891" cy="666648"/>
+          </a:xfrm>
+          <a:prstGeom prst="ellipse">
+            <a:avLst/>
+          </a:prstGeom>
+          <a:solidFill>
+            <a:schemeClr val="bg1"/>
+          </a:solidFill>
+          <a:ln w="19050">
+            <a:solidFill>
+              <a:schemeClr val="tx1"/>
+            </a:solidFill>
+          </a:ln>
+        </p:spPr>
+        <p:style>
+          <a:lnRef idx="2">
+            <a:schemeClr val="accent1">
+              <a:shade val="50000"/>
+            </a:schemeClr>
+          </a:lnRef>
+          <a:fillRef idx="1">
+            <a:schemeClr val="accent1"/>
+          </a:fillRef>
+          <a:effectRef idx="0">
+            <a:schemeClr val="accent1"/>
+          </a:effectRef>
+          <a:fontRef idx="minor">
+            <a:schemeClr val="lt1"/>
+          </a:fontRef>
+        </p:style>
+        <p:txBody>
+          <a:bodyPr rtlCol="0" anchor="ctr"/>
+          <a:lstStyle/>
+          <a:p>
+            <a:pPr algn="ctr"/>
+            <a:r>
+              <a:rPr lang="en-US" sz="1400" dirty="0">
+                <a:solidFill>
+                  <a:schemeClr val="tx1"/>
+                </a:solidFill>
+                <a:latin typeface="Times New Roman" panose="02020603050405020304" pitchFamily="18" charset="0"/>
+                <a:cs typeface="Times New Roman" panose="02020603050405020304" pitchFamily="18" charset="0"/>
+              </a:rPr>
+              <a:t>u</a:t>
+            </a:r>
+            <a:r>
+              <a:rPr lang="en-US" sz="1400" baseline="-25000" dirty="0">
+                <a:solidFill>
+                  <a:schemeClr val="tx1"/>
+                </a:solidFill>
+                <a:latin typeface="Times New Roman" panose="02020603050405020304" pitchFamily="18" charset="0"/>
+                <a:cs typeface="Times New Roman" panose="02020603050405020304" pitchFamily="18" charset="0"/>
+              </a:rPr>
+              <a:t>E4</a:t>
+            </a:r>
+            <a:endParaRPr lang="en-US" sz="1400" dirty="0">
+              <a:solidFill>
+                <a:schemeClr val="tx1"/>
+              </a:solidFill>
+              <a:latin typeface="Times New Roman" panose="02020603050405020304" pitchFamily="18" charset="0"/>
+              <a:cs typeface="Times New Roman" panose="02020603050405020304" pitchFamily="18" charset="0"/>
+            </a:endParaRPr>
+          </a:p>
+        </p:txBody>
+      </p:sp>
+      <p:cxnSp>
+        <p:nvCxnSpPr>
+          <p:cNvPr id="82" name="Straight Arrow Connector 81">
+            <a:extLst>
+              <a:ext uri="{FF2B5EF4-FFF2-40B4-BE49-F238E27FC236}">
+                <a16:creationId xmlns:a16="http://schemas.microsoft.com/office/drawing/2014/main" id="{CA3D7067-8470-43DE-AA39-BAEA64612FF3}"/>
+              </a:ext>
+            </a:extLst>
+          </p:cNvPr>
+          <p:cNvCxnSpPr>
+            <a:cxnSpLocks/>
+            <a:stCxn id="91" idx="2"/>
+            <a:endCxn id="89" idx="3"/>
+          </p:cNvCxnSpPr>
+          <p:nvPr/>
+        </p:nvCxnSpPr>
+        <p:spPr>
+          <a:xfrm flipH="1" flipV="1">
+            <a:off x="7105306" y="1969576"/>
+            <a:ext cx="739361" cy="871379"/>
+          </a:xfrm>
+          <a:prstGeom prst="straightConnector1">
+            <a:avLst/>
+          </a:prstGeom>
+          <a:ln w="19050">
+            <a:solidFill>
+              <a:schemeClr val="tx1"/>
+            </a:solidFill>
+            <a:tailEnd type="triangle"/>
+          </a:ln>
+        </p:spPr>
+        <p:style>
+          <a:lnRef idx="1">
+            <a:schemeClr val="accent1"/>
+          </a:lnRef>
+          <a:fillRef idx="0">
+            <a:schemeClr val="accent1"/>
+          </a:fillRef>
+          <a:effectRef idx="0">
+            <a:schemeClr val="accent1"/>
+          </a:effectRef>
+          <a:fontRef idx="minor">
+            <a:schemeClr val="tx1"/>
+          </a:fontRef>
+        </p:style>
+      </p:cxnSp>
+      <p:cxnSp>
+        <p:nvCxnSpPr>
+          <p:cNvPr id="83" name="Straight Arrow Connector 82">
+            <a:extLst>
+              <a:ext uri="{FF2B5EF4-FFF2-40B4-BE49-F238E27FC236}">
+                <a16:creationId xmlns:a16="http://schemas.microsoft.com/office/drawing/2014/main" id="{3CC18B6A-2CA3-4766-9BF3-AC0B48702838}"/>
+              </a:ext>
+            </a:extLst>
+          </p:cNvPr>
+          <p:cNvCxnSpPr>
+            <a:cxnSpLocks/>
+            <a:stCxn id="91" idx="2"/>
+            <a:endCxn id="90" idx="3"/>
+          </p:cNvCxnSpPr>
+          <p:nvPr/>
+        </p:nvCxnSpPr>
+        <p:spPr>
+          <a:xfrm flipH="1">
+            <a:off x="7105305" y="2840954"/>
+            <a:ext cx="739362" cy="2463"/>
+          </a:xfrm>
+          <a:prstGeom prst="straightConnector1">
+            <a:avLst/>
+          </a:prstGeom>
+          <a:ln w="19050">
+            <a:solidFill>
+              <a:schemeClr val="tx1"/>
+            </a:solidFill>
+            <a:tailEnd type="triangle"/>
+          </a:ln>
+        </p:spPr>
+        <p:style>
+          <a:lnRef idx="1">
+            <a:schemeClr val="accent1"/>
+          </a:lnRef>
+          <a:fillRef idx="0">
+            <a:schemeClr val="accent1"/>
+          </a:fillRef>
+          <a:effectRef idx="0">
+            <a:schemeClr val="accent1"/>
+          </a:effectRef>
+          <a:fontRef idx="minor">
+            <a:schemeClr val="tx1"/>
+          </a:fontRef>
+        </p:style>
+      </p:cxnSp>
+      <p:cxnSp>
+        <p:nvCxnSpPr>
+          <p:cNvPr id="84" name="Straight Arrow Connector 83">
+            <a:extLst>
+              <a:ext uri="{FF2B5EF4-FFF2-40B4-BE49-F238E27FC236}">
+                <a16:creationId xmlns:a16="http://schemas.microsoft.com/office/drawing/2014/main" id="{4D7920ED-7A0E-4378-A540-0A85FC9F6CE1}"/>
+              </a:ext>
+            </a:extLst>
+          </p:cNvPr>
+          <p:cNvCxnSpPr>
+            <a:cxnSpLocks/>
+            <a:stCxn id="91" idx="2"/>
+            <a:endCxn id="101" idx="3"/>
+          </p:cNvCxnSpPr>
+          <p:nvPr/>
+        </p:nvCxnSpPr>
+        <p:spPr>
+          <a:xfrm flipH="1">
+            <a:off x="7109848" y="2840954"/>
+            <a:ext cx="734819" cy="876305"/>
+          </a:xfrm>
+          <a:prstGeom prst="straightConnector1">
+            <a:avLst/>
+          </a:prstGeom>
+          <a:ln w="19050">
+            <a:solidFill>
+              <a:schemeClr val="tx1"/>
+            </a:solidFill>
+            <a:tailEnd type="triangle"/>
+          </a:ln>
+        </p:spPr>
+        <p:style>
+          <a:lnRef idx="1">
+            <a:schemeClr val="accent1"/>
+          </a:lnRef>
+          <a:fillRef idx="0">
+            <a:schemeClr val="accent1"/>
+          </a:fillRef>
+          <a:effectRef idx="0">
+            <a:schemeClr val="accent1"/>
+          </a:effectRef>
+          <a:fontRef idx="minor">
+            <a:schemeClr val="tx1"/>
+          </a:fontRef>
+        </p:style>
+      </p:cxnSp>
+      <p:cxnSp>
+        <p:nvCxnSpPr>
+          <p:cNvPr id="85" name="Straight Arrow Connector 84">
+            <a:extLst>
+              <a:ext uri="{FF2B5EF4-FFF2-40B4-BE49-F238E27FC236}">
+                <a16:creationId xmlns:a16="http://schemas.microsoft.com/office/drawing/2014/main" id="{47460C04-B410-48B0-9E6E-55FA465FA79E}"/>
+              </a:ext>
+            </a:extLst>
+          </p:cNvPr>
+          <p:cNvCxnSpPr>
+            <a:cxnSpLocks/>
+            <a:stCxn id="91" idx="2"/>
+            <a:endCxn id="104" idx="3"/>
+          </p:cNvCxnSpPr>
+          <p:nvPr/>
+        </p:nvCxnSpPr>
+        <p:spPr>
+          <a:xfrm flipH="1">
+            <a:off x="7113955" y="2840954"/>
+            <a:ext cx="730713" cy="1768903"/>
+          </a:xfrm>
+          <a:prstGeom prst="straightConnector1">
+            <a:avLst/>
+          </a:prstGeom>
+          <a:ln w="19050">
+            <a:solidFill>
+              <a:schemeClr val="tx1"/>
+            </a:solidFill>
+            <a:tailEnd type="triangle"/>
+          </a:ln>
+        </p:spPr>
+        <p:style>
+          <a:lnRef idx="1">
+            <a:schemeClr val="accent1"/>
+          </a:lnRef>
+          <a:fillRef idx="0">
+            <a:schemeClr val="accent1"/>
+          </a:fillRef>
+          <a:effectRef idx="0">
+            <a:schemeClr val="accent1"/>
+          </a:effectRef>
+          <a:fontRef idx="minor">
+            <a:schemeClr val="tx1"/>
+          </a:fontRef>
+        </p:style>
+      </p:cxnSp>
+      <p:cxnSp>
+        <p:nvCxnSpPr>
+          <p:cNvPr id="102" name="Straight Arrow Connector 101">
+            <a:extLst>
+              <a:ext uri="{FF2B5EF4-FFF2-40B4-BE49-F238E27FC236}">
+                <a16:creationId xmlns:a16="http://schemas.microsoft.com/office/drawing/2014/main" id="{472D759D-5652-407E-A1EB-EE29B8B90E81}"/>
+              </a:ext>
+            </a:extLst>
+          </p:cNvPr>
+          <p:cNvCxnSpPr>
+            <a:cxnSpLocks/>
+            <a:stCxn id="88" idx="1"/>
+            <a:endCxn id="95" idx="6"/>
+          </p:cNvCxnSpPr>
+          <p:nvPr/>
+        </p:nvCxnSpPr>
+        <p:spPr>
+          <a:xfrm flipH="1" flipV="1">
+            <a:off x="5976493" y="1090873"/>
+            <a:ext cx="362907" cy="3951"/>
+          </a:xfrm>
+          <a:prstGeom prst="straightConnector1">
+            <a:avLst/>
+          </a:prstGeom>
+          <a:ln w="19050">
+            <a:solidFill>
+              <a:schemeClr val="tx1"/>
+            </a:solidFill>
+            <a:tailEnd type="triangle"/>
+          </a:ln>
+        </p:spPr>
+        <p:style>
+          <a:lnRef idx="1">
+            <a:schemeClr val="accent1"/>
+          </a:lnRef>
+          <a:fillRef idx="0">
+            <a:schemeClr val="accent1"/>
+          </a:fillRef>
+          <a:effectRef idx="0">
+            <a:schemeClr val="accent1"/>
+          </a:effectRef>
+          <a:fontRef idx="minor">
+            <a:schemeClr val="tx1"/>
+          </a:fontRef>
+        </p:style>
+      </p:cxnSp>
+      <p:cxnSp>
+        <p:nvCxnSpPr>
+          <p:cNvPr id="103" name="Straight Arrow Connector 102">
+            <a:extLst>
+              <a:ext uri="{FF2B5EF4-FFF2-40B4-BE49-F238E27FC236}">
+                <a16:creationId xmlns:a16="http://schemas.microsoft.com/office/drawing/2014/main" id="{D429CC5F-C632-42B8-B4F7-A116CB8887D8}"/>
+              </a:ext>
+            </a:extLst>
+          </p:cNvPr>
+          <p:cNvCxnSpPr>
+            <a:cxnSpLocks/>
+            <a:stCxn id="89" idx="1"/>
+            <a:endCxn id="99" idx="6"/>
+          </p:cNvCxnSpPr>
+          <p:nvPr/>
+        </p:nvCxnSpPr>
+        <p:spPr>
+          <a:xfrm flipH="1">
+            <a:off x="5976493" y="1969576"/>
+            <a:ext cx="362907" cy="5660"/>
+          </a:xfrm>
+          <a:prstGeom prst="straightConnector1">
+            <a:avLst/>
+          </a:prstGeom>
+          <a:ln w="19050">
+            <a:solidFill>
+              <a:schemeClr val="tx1"/>
+            </a:solidFill>
+            <a:tailEnd type="triangle"/>
+          </a:ln>
+        </p:spPr>
+        <p:style>
+          <a:lnRef idx="1">
+            <a:schemeClr val="accent1"/>
+          </a:lnRef>
+          <a:fillRef idx="0">
+            <a:schemeClr val="accent1"/>
+          </a:fillRef>
+          <a:effectRef idx="0">
+            <a:schemeClr val="accent1"/>
+          </a:effectRef>
+          <a:fontRef idx="minor">
+            <a:schemeClr val="tx1"/>
+          </a:fontRef>
+        </p:style>
+      </p:cxnSp>
+      <p:cxnSp>
+        <p:nvCxnSpPr>
+          <p:cNvPr id="105" name="Straight Arrow Connector 104">
+            <a:extLst>
+              <a:ext uri="{FF2B5EF4-FFF2-40B4-BE49-F238E27FC236}">
+                <a16:creationId xmlns:a16="http://schemas.microsoft.com/office/drawing/2014/main" id="{51C551C1-0185-4DC9-A2E7-6F80D46F8983}"/>
+              </a:ext>
+            </a:extLst>
+          </p:cNvPr>
+          <p:cNvCxnSpPr>
+            <a:cxnSpLocks/>
+            <a:stCxn id="90" idx="1"/>
+            <a:endCxn id="97" idx="6"/>
+          </p:cNvCxnSpPr>
+          <p:nvPr/>
+        </p:nvCxnSpPr>
+        <p:spPr>
+          <a:xfrm flipH="1" flipV="1">
+            <a:off x="5971907" y="2840956"/>
+            <a:ext cx="367491" cy="2462"/>
+          </a:xfrm>
+          <a:prstGeom prst="straightConnector1">
+            <a:avLst/>
+          </a:prstGeom>
+          <a:ln w="19050">
+            <a:solidFill>
+              <a:schemeClr val="tx1"/>
+            </a:solidFill>
+            <a:tailEnd type="triangle"/>
+          </a:ln>
+        </p:spPr>
+        <p:style>
+          <a:lnRef idx="1">
+            <a:schemeClr val="accent1"/>
+          </a:lnRef>
+          <a:fillRef idx="0">
+            <a:schemeClr val="accent1"/>
+          </a:fillRef>
+          <a:effectRef idx="0">
+            <a:schemeClr val="accent1"/>
+          </a:effectRef>
+          <a:fontRef idx="minor">
+            <a:schemeClr val="tx1"/>
+          </a:fontRef>
+        </p:style>
+      </p:cxnSp>
+      <p:cxnSp>
+        <p:nvCxnSpPr>
+          <p:cNvPr id="111" name="Straight Arrow Connector 110">
+            <a:extLst>
+              <a:ext uri="{FF2B5EF4-FFF2-40B4-BE49-F238E27FC236}">
+                <a16:creationId xmlns:a16="http://schemas.microsoft.com/office/drawing/2014/main" id="{C7424D51-33CC-4D71-9FF6-8F408FAA996F}"/>
+              </a:ext>
+            </a:extLst>
+          </p:cNvPr>
+          <p:cNvCxnSpPr>
+            <a:cxnSpLocks/>
+            <a:stCxn id="101" idx="1"/>
+            <a:endCxn id="112" idx="6"/>
+          </p:cNvCxnSpPr>
+          <p:nvPr/>
+        </p:nvCxnSpPr>
+        <p:spPr>
+          <a:xfrm flipH="1" flipV="1">
+            <a:off x="5976493" y="3711124"/>
+            <a:ext cx="367448" cy="6135"/>
+          </a:xfrm>
+          <a:prstGeom prst="straightConnector1">
+            <a:avLst/>
+          </a:prstGeom>
+          <a:ln w="19050">
+            <a:solidFill>
+              <a:schemeClr val="tx1"/>
+            </a:solidFill>
+            <a:tailEnd type="triangle"/>
+          </a:ln>
+        </p:spPr>
+        <p:style>
+          <a:lnRef idx="1">
+            <a:schemeClr val="accent1"/>
+          </a:lnRef>
+          <a:fillRef idx="0">
+            <a:schemeClr val="accent1"/>
+          </a:fillRef>
+          <a:effectRef idx="0">
+            <a:schemeClr val="accent1"/>
+          </a:effectRef>
+          <a:fontRef idx="minor">
+            <a:schemeClr val="tx1"/>
+          </a:fontRef>
+        </p:style>
+      </p:cxnSp>
+      <p:cxnSp>
+        <p:nvCxnSpPr>
+          <p:cNvPr id="114" name="Straight Arrow Connector 113">
+            <a:extLst>
+              <a:ext uri="{FF2B5EF4-FFF2-40B4-BE49-F238E27FC236}">
+                <a16:creationId xmlns:a16="http://schemas.microsoft.com/office/drawing/2014/main" id="{86E09474-22B3-49BA-9C48-8F5EA37CC7C0}"/>
+              </a:ext>
+            </a:extLst>
+          </p:cNvPr>
+          <p:cNvCxnSpPr>
+            <a:cxnSpLocks/>
+            <a:stCxn id="104" idx="1"/>
+            <a:endCxn id="109" idx="6"/>
+          </p:cNvCxnSpPr>
+          <p:nvPr/>
+        </p:nvCxnSpPr>
+        <p:spPr>
+          <a:xfrm flipH="1">
+            <a:off x="5971907" y="4609857"/>
+            <a:ext cx="376141" cy="7351"/>
+          </a:xfrm>
+          <a:prstGeom prst="straightConnector1">
+            <a:avLst/>
+          </a:prstGeom>
+          <a:ln w="19050">
+            <a:solidFill>
+              <a:schemeClr val="tx1"/>
+            </a:solidFill>
+            <a:tailEnd type="triangle"/>
+          </a:ln>
+        </p:spPr>
+        <p:style>
+          <a:lnRef idx="1">
+            <a:schemeClr val="accent1"/>
+          </a:lnRef>
+          <a:fillRef idx="0">
+            <a:schemeClr val="accent1"/>
+          </a:fillRef>
+          <a:effectRef idx="0">
+            <a:schemeClr val="accent1"/>
+          </a:effectRef>
+          <a:fontRef idx="minor">
+            <a:schemeClr val="tx1"/>
+          </a:fontRef>
+        </p:style>
+      </p:cxnSp>
+      <p:sp>
+        <p:nvSpPr>
+          <p:cNvPr id="197" name="Rectangle 196">
+            <a:extLst>
+              <a:ext uri="{FF2B5EF4-FFF2-40B4-BE49-F238E27FC236}">
+                <a16:creationId xmlns:a16="http://schemas.microsoft.com/office/drawing/2014/main" id="{A543EF41-895D-4484-BF68-3124022653EE}"/>
+              </a:ext>
+            </a:extLst>
+          </p:cNvPr>
+          <p:cNvSpPr/>
+          <p:nvPr/>
+        </p:nvSpPr>
+        <p:spPr>
+          <a:xfrm>
+            <a:off x="6339400" y="5814963"/>
+            <a:ext cx="765907" cy="749885"/>
+          </a:xfrm>
+          <a:prstGeom prst="rect">
+            <a:avLst/>
+          </a:prstGeom>
+          <a:solidFill>
+            <a:schemeClr val="bg1"/>
+          </a:solidFill>
+          <a:ln w="19050">
+            <a:solidFill>
+              <a:schemeClr val="tx1"/>
+            </a:solidFill>
+          </a:ln>
+        </p:spPr>
+        <p:style>
+          <a:lnRef idx="2">
+            <a:schemeClr val="accent1">
+              <a:shade val="50000"/>
+            </a:schemeClr>
+          </a:lnRef>
+          <a:fillRef idx="1">
+            <a:schemeClr val="accent1"/>
+          </a:fillRef>
+          <a:effectRef idx="0">
+            <a:schemeClr val="accent1"/>
+          </a:effectRef>
+          <a:fontRef idx="minor">
+            <a:schemeClr val="lt1"/>
+          </a:fontRef>
+        </p:style>
+        <p:txBody>
+          <a:bodyPr rot="0" spcFirstLastPara="0" vertOverflow="overflow" horzOverflow="overflow" vert="horz" wrap="square" lIns="53996" tIns="26998" rIns="53996" bIns="26998" numCol="1" spcCol="0" rtlCol="0" fromWordArt="0" anchor="ctr" anchorCtr="0" forceAA="0" compatLnSpc="1">
+            <a:prstTxWarp prst="textNoShape">
+              <a:avLst/>
+            </a:prstTxWarp>
+            <a:noAutofit/>
+          </a:bodyPr>
+          <a:lstStyle/>
+          <a:p>
+            <a:pPr algn="ctr"/>
+            <a:r>
+              <a:rPr lang="en-US" sz="1600" dirty="0">
+                <a:solidFill>
+                  <a:schemeClr val="tx1"/>
+                </a:solidFill>
+                <a:latin typeface="Times New Roman" panose="02020603050405020304" pitchFamily="18" charset="0"/>
+                <a:cs typeface="Times New Roman" panose="02020603050405020304" pitchFamily="18" charset="0"/>
+              </a:rPr>
+              <a:t>O1</a:t>
+            </a:r>
+          </a:p>
+        </p:txBody>
+      </p:sp>
+      <p:sp>
+        <p:nvSpPr>
+          <p:cNvPr id="198" name="Rectangle 197">
+            <a:extLst>
+              <a:ext uri="{FF2B5EF4-FFF2-40B4-BE49-F238E27FC236}">
+                <a16:creationId xmlns:a16="http://schemas.microsoft.com/office/drawing/2014/main" id="{3C069EE3-0F60-45AB-AF3D-19AC9F644A39}"/>
+              </a:ext>
+            </a:extLst>
+          </p:cNvPr>
+          <p:cNvSpPr/>
+          <p:nvPr/>
+        </p:nvSpPr>
+        <p:spPr>
+          <a:xfrm>
+            <a:off x="6339400" y="6689715"/>
+            <a:ext cx="765907" cy="749885"/>
+          </a:xfrm>
+          <a:prstGeom prst="rect">
+            <a:avLst/>
+          </a:prstGeom>
+          <a:solidFill>
+            <a:schemeClr val="bg1"/>
+          </a:solidFill>
+          <a:ln w="19050">
+            <a:solidFill>
+              <a:schemeClr val="tx1"/>
+            </a:solidFill>
+          </a:ln>
+        </p:spPr>
+        <p:style>
+          <a:lnRef idx="2">
+            <a:schemeClr val="accent1">
+              <a:shade val="50000"/>
+            </a:schemeClr>
+          </a:lnRef>
+          <a:fillRef idx="1">
+            <a:schemeClr val="accent1"/>
+          </a:fillRef>
+          <a:effectRef idx="0">
+            <a:schemeClr val="accent1"/>
+          </a:effectRef>
+          <a:fontRef idx="minor">
+            <a:schemeClr val="lt1"/>
+          </a:fontRef>
+        </p:style>
+        <p:txBody>
+          <a:bodyPr rot="0" spcFirstLastPara="0" vertOverflow="overflow" horzOverflow="overflow" vert="horz" wrap="square" lIns="53996" tIns="26998" rIns="53996" bIns="26998" numCol="1" spcCol="0" rtlCol="0" fromWordArt="0" anchor="ctr" anchorCtr="0" forceAA="0" compatLnSpc="1">
+            <a:prstTxWarp prst="textNoShape">
+              <a:avLst/>
+            </a:prstTxWarp>
+            <a:noAutofit/>
+          </a:bodyPr>
+          <a:lstStyle/>
+          <a:p>
+            <a:pPr algn="ctr"/>
+            <a:r>
+              <a:rPr lang="en-US" sz="1600" dirty="0">
+                <a:solidFill>
+                  <a:schemeClr val="tx1"/>
+                </a:solidFill>
+                <a:latin typeface="Times New Roman" panose="02020603050405020304" pitchFamily="18" charset="0"/>
+                <a:cs typeface="Times New Roman" panose="02020603050405020304" pitchFamily="18" charset="0"/>
+              </a:rPr>
+              <a:t>O2</a:t>
+            </a:r>
+          </a:p>
+        </p:txBody>
+      </p:sp>
+      <p:sp>
+        <p:nvSpPr>
+          <p:cNvPr id="199" name="Rectangle 198">
+            <a:extLst>
+              <a:ext uri="{FF2B5EF4-FFF2-40B4-BE49-F238E27FC236}">
+                <a16:creationId xmlns:a16="http://schemas.microsoft.com/office/drawing/2014/main" id="{97C44840-C117-458B-B458-8DB93737C337}"/>
+              </a:ext>
+            </a:extLst>
+          </p:cNvPr>
+          <p:cNvSpPr/>
+          <p:nvPr/>
+        </p:nvSpPr>
+        <p:spPr>
+          <a:xfrm>
+            <a:off x="6339398" y="7563556"/>
+            <a:ext cx="765907" cy="749885"/>
+          </a:xfrm>
+          <a:prstGeom prst="rect">
+            <a:avLst/>
+          </a:prstGeom>
+          <a:solidFill>
+            <a:schemeClr val="bg1"/>
+          </a:solidFill>
+          <a:ln w="19050">
+            <a:solidFill>
+              <a:schemeClr val="tx1"/>
+            </a:solidFill>
+          </a:ln>
+        </p:spPr>
+        <p:style>
+          <a:lnRef idx="2">
+            <a:schemeClr val="accent1">
+              <a:shade val="50000"/>
+            </a:schemeClr>
+          </a:lnRef>
+          <a:fillRef idx="1">
+            <a:schemeClr val="accent1"/>
+          </a:fillRef>
+          <a:effectRef idx="0">
+            <a:schemeClr val="accent1"/>
+          </a:effectRef>
+          <a:fontRef idx="minor">
+            <a:schemeClr val="lt1"/>
+          </a:fontRef>
+        </p:style>
+        <p:txBody>
+          <a:bodyPr rot="0" spcFirstLastPara="0" vertOverflow="overflow" horzOverflow="overflow" vert="horz" wrap="square" lIns="53996" tIns="26998" rIns="53996" bIns="26998" numCol="1" spcCol="0" rtlCol="0" fromWordArt="0" anchor="ctr" anchorCtr="0" forceAA="0" compatLnSpc="1">
+            <a:prstTxWarp prst="textNoShape">
+              <a:avLst/>
+            </a:prstTxWarp>
+            <a:noAutofit/>
+          </a:bodyPr>
+          <a:lstStyle/>
+          <a:p>
+            <a:pPr algn="ctr"/>
+            <a:r>
+              <a:rPr lang="en-US" sz="1600" dirty="0">
+                <a:solidFill>
+                  <a:schemeClr val="tx1"/>
+                </a:solidFill>
+                <a:latin typeface="Times New Roman" panose="02020603050405020304" pitchFamily="18" charset="0"/>
+                <a:cs typeface="Times New Roman" panose="02020603050405020304" pitchFamily="18" charset="0"/>
+              </a:rPr>
+              <a:t>O3</a:t>
+            </a:r>
+          </a:p>
+        </p:txBody>
+      </p:sp>
+      <p:sp>
+        <p:nvSpPr>
+          <p:cNvPr id="200" name="Oval 199">
+            <a:extLst>
+              <a:ext uri="{FF2B5EF4-FFF2-40B4-BE49-F238E27FC236}">
+                <a16:creationId xmlns:a16="http://schemas.microsoft.com/office/drawing/2014/main" id="{C8DB1650-2FB6-42CE-92F7-AAE924D221FE}"/>
+              </a:ext>
+            </a:extLst>
+          </p:cNvPr>
+          <p:cNvSpPr/>
+          <p:nvPr/>
+        </p:nvSpPr>
+        <p:spPr>
+          <a:xfrm>
+            <a:off x="7844667" y="7136060"/>
+            <a:ext cx="1634140" cy="1599952"/>
+          </a:xfrm>
+          <a:prstGeom prst="ellipse">
+            <a:avLst/>
+          </a:prstGeom>
+          <a:solidFill>
+            <a:schemeClr val="bg1"/>
+          </a:solidFill>
+          <a:ln w="19050">
+            <a:solidFill>
+              <a:schemeClr val="tx1"/>
+            </a:solidFill>
+          </a:ln>
+        </p:spPr>
+        <p:style>
+          <a:lnRef idx="2">
+            <a:schemeClr val="accent1">
+              <a:shade val="50000"/>
+            </a:schemeClr>
+          </a:lnRef>
+          <a:fillRef idx="1">
+            <a:schemeClr val="accent1"/>
+          </a:fillRef>
+          <a:effectRef idx="0">
+            <a:schemeClr val="accent1"/>
+          </a:effectRef>
+          <a:fontRef idx="minor">
+            <a:schemeClr val="lt1"/>
+          </a:fontRef>
+        </p:style>
+        <p:txBody>
+          <a:bodyPr lIns="0" rIns="0" rtlCol="0" anchor="ctr"/>
+          <a:lstStyle/>
+          <a:p>
+            <a:pPr algn="ctr"/>
+            <a:r>
+              <a:rPr lang="en-US" sz="1600" dirty="0">
+                <a:solidFill>
+                  <a:schemeClr val="tx1"/>
+                </a:solidFill>
+                <a:latin typeface="Times New Roman" panose="02020603050405020304" pitchFamily="18" charset="0"/>
+                <a:cs typeface="Times New Roman" panose="02020603050405020304" pitchFamily="18" charset="0"/>
+              </a:rPr>
+              <a:t>Openness</a:t>
+            </a:r>
+          </a:p>
+        </p:txBody>
+      </p:sp>
+      <p:cxnSp>
+        <p:nvCxnSpPr>
+          <p:cNvPr id="201" name="Straight Arrow Connector 200">
+            <a:extLst>
+              <a:ext uri="{FF2B5EF4-FFF2-40B4-BE49-F238E27FC236}">
+                <a16:creationId xmlns:a16="http://schemas.microsoft.com/office/drawing/2014/main" id="{F895DEA3-A199-40E3-B654-6B8DAB849B5C}"/>
+              </a:ext>
+            </a:extLst>
+          </p:cNvPr>
+          <p:cNvCxnSpPr>
+            <a:cxnSpLocks/>
+            <a:stCxn id="200" idx="2"/>
+            <a:endCxn id="197" idx="3"/>
+          </p:cNvCxnSpPr>
+          <p:nvPr/>
+        </p:nvCxnSpPr>
+        <p:spPr>
+          <a:xfrm flipH="1" flipV="1">
+            <a:off x="7105306" y="6189906"/>
+            <a:ext cx="739361" cy="1746130"/>
+          </a:xfrm>
+          <a:prstGeom prst="straightConnector1">
+            <a:avLst/>
+          </a:prstGeom>
+          <a:ln w="19050">
+            <a:solidFill>
+              <a:schemeClr val="tx1"/>
+            </a:solidFill>
+            <a:tailEnd type="triangle"/>
+          </a:ln>
+        </p:spPr>
+        <p:style>
+          <a:lnRef idx="1">
+            <a:schemeClr val="accent1"/>
+          </a:lnRef>
+          <a:fillRef idx="0">
+            <a:schemeClr val="accent1"/>
+          </a:fillRef>
+          <a:effectRef idx="0">
+            <a:schemeClr val="accent1"/>
+          </a:effectRef>
+          <a:fontRef idx="minor">
+            <a:schemeClr val="tx1"/>
+          </a:fontRef>
+        </p:style>
+      </p:cxnSp>
+      <p:sp>
+        <p:nvSpPr>
+          <p:cNvPr id="202" name="Oval 201">
+            <a:extLst>
+              <a:ext uri="{FF2B5EF4-FFF2-40B4-BE49-F238E27FC236}">
+                <a16:creationId xmlns:a16="http://schemas.microsoft.com/office/drawing/2014/main" id="{A9D91B1F-5886-4617-A18F-F89A9CFFED92}"/>
+              </a:ext>
+            </a:extLst>
+          </p:cNvPr>
+          <p:cNvSpPr>
+            <a:spLocks noChangeAspect="1"/>
+          </p:cNvSpPr>
+          <p:nvPr/>
+        </p:nvSpPr>
+        <p:spPr>
+          <a:xfrm>
+            <a:off x="5295602" y="5852631"/>
+            <a:ext cx="680891" cy="666648"/>
+          </a:xfrm>
+          <a:prstGeom prst="ellipse">
+            <a:avLst/>
+          </a:prstGeom>
+          <a:solidFill>
+            <a:schemeClr val="bg1"/>
+          </a:solidFill>
+          <a:ln w="19050">
+            <a:solidFill>
+              <a:schemeClr val="tx1"/>
+            </a:solidFill>
+          </a:ln>
+        </p:spPr>
+        <p:style>
+          <a:lnRef idx="2">
+            <a:schemeClr val="accent1">
+              <a:shade val="50000"/>
+            </a:schemeClr>
+          </a:lnRef>
+          <a:fillRef idx="1">
+            <a:schemeClr val="accent1"/>
+          </a:fillRef>
+          <a:effectRef idx="0">
+            <a:schemeClr val="accent1"/>
+          </a:effectRef>
+          <a:fontRef idx="minor">
+            <a:schemeClr val="lt1"/>
+          </a:fontRef>
+        </p:style>
+        <p:txBody>
+          <a:bodyPr rtlCol="0" anchor="ctr"/>
+          <a:lstStyle/>
+          <a:p>
+            <a:pPr algn="ctr"/>
+            <a:r>
+              <a:rPr lang="en-US" sz="1400" dirty="0">
+                <a:solidFill>
+                  <a:schemeClr val="tx1"/>
+                </a:solidFill>
+                <a:latin typeface="Times New Roman" panose="02020603050405020304" pitchFamily="18" charset="0"/>
+                <a:cs typeface="Times New Roman" panose="02020603050405020304" pitchFamily="18" charset="0"/>
+              </a:rPr>
+              <a:t>u</a:t>
+            </a:r>
+            <a:r>
+              <a:rPr lang="en-US" sz="1400" baseline="-25000" dirty="0">
+                <a:solidFill>
+                  <a:schemeClr val="tx1"/>
+                </a:solidFill>
+                <a:latin typeface="Times New Roman" panose="02020603050405020304" pitchFamily="18" charset="0"/>
+                <a:cs typeface="Times New Roman" panose="02020603050405020304" pitchFamily="18" charset="0"/>
+              </a:rPr>
+              <a:t>O1</a:t>
+            </a:r>
+            <a:endParaRPr lang="en-US" sz="1400" dirty="0">
+              <a:solidFill>
+                <a:schemeClr val="tx1"/>
+              </a:solidFill>
+              <a:latin typeface="Times New Roman" panose="02020603050405020304" pitchFamily="18" charset="0"/>
+              <a:cs typeface="Times New Roman" panose="02020603050405020304" pitchFamily="18" charset="0"/>
+            </a:endParaRPr>
+          </a:p>
+        </p:txBody>
+      </p:sp>
+      <p:sp>
+        <p:nvSpPr>
+          <p:cNvPr id="203" name="Oval 202">
+            <a:extLst>
+              <a:ext uri="{FF2B5EF4-FFF2-40B4-BE49-F238E27FC236}">
+                <a16:creationId xmlns:a16="http://schemas.microsoft.com/office/drawing/2014/main" id="{47663250-19EA-4D1D-B253-909B01FB15A9}"/>
+              </a:ext>
+            </a:extLst>
+          </p:cNvPr>
+          <p:cNvSpPr>
+            <a:spLocks noChangeAspect="1"/>
+          </p:cNvSpPr>
+          <p:nvPr/>
+        </p:nvSpPr>
+        <p:spPr>
+          <a:xfrm>
+            <a:off x="5291016" y="7602713"/>
+            <a:ext cx="680891" cy="666648"/>
+          </a:xfrm>
+          <a:prstGeom prst="ellipse">
+            <a:avLst/>
+          </a:prstGeom>
+          <a:solidFill>
+            <a:schemeClr val="bg1"/>
+          </a:solidFill>
+          <a:ln w="19050">
+            <a:solidFill>
+              <a:schemeClr val="tx1"/>
+            </a:solidFill>
+          </a:ln>
+        </p:spPr>
+        <p:style>
+          <a:lnRef idx="2">
+            <a:schemeClr val="accent1">
+              <a:shade val="50000"/>
+            </a:schemeClr>
+          </a:lnRef>
+          <a:fillRef idx="1">
+            <a:schemeClr val="accent1"/>
+          </a:fillRef>
+          <a:effectRef idx="0">
+            <a:schemeClr val="accent1"/>
+          </a:effectRef>
+          <a:fontRef idx="minor">
+            <a:schemeClr val="lt1"/>
+          </a:fontRef>
+        </p:style>
+        <p:txBody>
+          <a:bodyPr rtlCol="0" anchor="ctr"/>
+          <a:lstStyle/>
+          <a:p>
+            <a:pPr algn="ctr"/>
+            <a:r>
+              <a:rPr lang="en-US" sz="1400" dirty="0">
+                <a:solidFill>
+                  <a:schemeClr val="tx1"/>
+                </a:solidFill>
+                <a:latin typeface="Times New Roman" panose="02020603050405020304" pitchFamily="18" charset="0"/>
+                <a:cs typeface="Times New Roman" panose="02020603050405020304" pitchFamily="18" charset="0"/>
+              </a:rPr>
+              <a:t>u</a:t>
+            </a:r>
+            <a:r>
+              <a:rPr lang="en-US" sz="1400" baseline="-25000" dirty="0">
+                <a:solidFill>
+                  <a:schemeClr val="tx1"/>
+                </a:solidFill>
+                <a:latin typeface="Times New Roman" panose="02020603050405020304" pitchFamily="18" charset="0"/>
+                <a:cs typeface="Times New Roman" panose="02020603050405020304" pitchFamily="18" charset="0"/>
+              </a:rPr>
+              <a:t>O3</a:t>
+            </a:r>
+            <a:endParaRPr lang="en-US" sz="1400" dirty="0">
+              <a:solidFill>
+                <a:schemeClr val="tx1"/>
+              </a:solidFill>
+              <a:latin typeface="Times New Roman" panose="02020603050405020304" pitchFamily="18" charset="0"/>
+              <a:cs typeface="Times New Roman" panose="02020603050405020304" pitchFamily="18" charset="0"/>
+            </a:endParaRPr>
+          </a:p>
+        </p:txBody>
+      </p:sp>
+      <p:sp>
+        <p:nvSpPr>
+          <p:cNvPr id="204" name="Oval 203">
+            <a:extLst>
+              <a:ext uri="{FF2B5EF4-FFF2-40B4-BE49-F238E27FC236}">
+                <a16:creationId xmlns:a16="http://schemas.microsoft.com/office/drawing/2014/main" id="{211FD5A3-7BF2-4554-B8CA-2059205E96B2}"/>
+              </a:ext>
+            </a:extLst>
+          </p:cNvPr>
+          <p:cNvSpPr>
+            <a:spLocks noChangeAspect="1"/>
+          </p:cNvSpPr>
+          <p:nvPr/>
+        </p:nvSpPr>
+        <p:spPr>
+          <a:xfrm>
+            <a:off x="5295602" y="6736993"/>
+            <a:ext cx="680891" cy="666648"/>
+          </a:xfrm>
+          <a:prstGeom prst="ellipse">
+            <a:avLst/>
+          </a:prstGeom>
+          <a:solidFill>
+            <a:schemeClr val="bg1"/>
+          </a:solidFill>
+          <a:ln w="19050">
+            <a:solidFill>
+              <a:schemeClr val="tx1"/>
+            </a:solidFill>
+          </a:ln>
+        </p:spPr>
+        <p:style>
+          <a:lnRef idx="2">
+            <a:schemeClr val="accent1">
+              <a:shade val="50000"/>
+            </a:schemeClr>
+          </a:lnRef>
+          <a:fillRef idx="1">
+            <a:schemeClr val="accent1"/>
+          </a:fillRef>
+          <a:effectRef idx="0">
+            <a:schemeClr val="accent1"/>
+          </a:effectRef>
+          <a:fontRef idx="minor">
+            <a:schemeClr val="lt1"/>
+          </a:fontRef>
+        </p:style>
+        <p:txBody>
+          <a:bodyPr rtlCol="0" anchor="ctr"/>
+          <a:lstStyle/>
+          <a:p>
+            <a:pPr algn="ctr"/>
+            <a:r>
+              <a:rPr lang="en-US" sz="1400" dirty="0">
+                <a:solidFill>
+                  <a:schemeClr val="tx1"/>
+                </a:solidFill>
+                <a:latin typeface="Times New Roman" panose="02020603050405020304" pitchFamily="18" charset="0"/>
+                <a:cs typeface="Times New Roman" panose="02020603050405020304" pitchFamily="18" charset="0"/>
+              </a:rPr>
+              <a:t>u</a:t>
+            </a:r>
+            <a:r>
+              <a:rPr lang="en-US" sz="1400" baseline="-25000" dirty="0">
+                <a:solidFill>
+                  <a:schemeClr val="tx1"/>
+                </a:solidFill>
+                <a:latin typeface="Times New Roman" panose="02020603050405020304" pitchFamily="18" charset="0"/>
+                <a:cs typeface="Times New Roman" panose="02020603050405020304" pitchFamily="18" charset="0"/>
+              </a:rPr>
+              <a:t>O2</a:t>
+            </a:r>
+            <a:endParaRPr lang="en-US" sz="1400" dirty="0">
+              <a:solidFill>
+                <a:schemeClr val="tx1"/>
+              </a:solidFill>
+              <a:latin typeface="Times New Roman" panose="02020603050405020304" pitchFamily="18" charset="0"/>
+              <a:cs typeface="Times New Roman" panose="02020603050405020304" pitchFamily="18" charset="0"/>
+            </a:endParaRPr>
+          </a:p>
+        </p:txBody>
+      </p:sp>
+      <p:sp>
+        <p:nvSpPr>
+          <p:cNvPr id="205" name="Rectangle 204">
+            <a:extLst>
+              <a:ext uri="{FF2B5EF4-FFF2-40B4-BE49-F238E27FC236}">
+                <a16:creationId xmlns:a16="http://schemas.microsoft.com/office/drawing/2014/main" id="{B79542C6-4EC9-4B68-8B65-62A144154CD1}"/>
+              </a:ext>
+            </a:extLst>
+          </p:cNvPr>
+          <p:cNvSpPr/>
+          <p:nvPr/>
+        </p:nvSpPr>
+        <p:spPr>
+          <a:xfrm>
+            <a:off x="6343941" y="8437398"/>
+            <a:ext cx="765907" cy="749885"/>
+          </a:xfrm>
+          <a:prstGeom prst="rect">
+            <a:avLst/>
+          </a:prstGeom>
+          <a:solidFill>
+            <a:schemeClr val="bg1"/>
+          </a:solidFill>
+          <a:ln w="19050">
+            <a:solidFill>
+              <a:schemeClr val="tx1"/>
+            </a:solidFill>
+          </a:ln>
+        </p:spPr>
+        <p:style>
+          <a:lnRef idx="2">
+            <a:schemeClr val="accent1">
+              <a:shade val="50000"/>
+            </a:schemeClr>
+          </a:lnRef>
+          <a:fillRef idx="1">
+            <a:schemeClr val="accent1"/>
+          </a:fillRef>
+          <a:effectRef idx="0">
+            <a:schemeClr val="accent1"/>
+          </a:effectRef>
+          <a:fontRef idx="minor">
+            <a:schemeClr val="lt1"/>
+          </a:fontRef>
+        </p:style>
+        <p:txBody>
+          <a:bodyPr rot="0" spcFirstLastPara="0" vertOverflow="overflow" horzOverflow="overflow" vert="horz" wrap="square" lIns="53996" tIns="26998" rIns="53996" bIns="26998" numCol="1" spcCol="0" rtlCol="0" fromWordArt="0" anchor="ctr" anchorCtr="0" forceAA="0" compatLnSpc="1">
+            <a:prstTxWarp prst="textNoShape">
+              <a:avLst/>
+            </a:prstTxWarp>
+            <a:noAutofit/>
+          </a:bodyPr>
+          <a:lstStyle/>
+          <a:p>
+            <a:pPr algn="ctr"/>
+            <a:r>
+              <a:rPr lang="en-US" sz="1600" dirty="0">
+                <a:solidFill>
+                  <a:schemeClr val="tx1"/>
+                </a:solidFill>
+                <a:latin typeface="Times New Roman" panose="02020603050405020304" pitchFamily="18" charset="0"/>
+                <a:cs typeface="Times New Roman" panose="02020603050405020304" pitchFamily="18" charset="0"/>
+              </a:rPr>
+              <a:t>O4</a:t>
+            </a:r>
+          </a:p>
+        </p:txBody>
+      </p:sp>
+      <p:sp>
+        <p:nvSpPr>
+          <p:cNvPr id="206" name="Rectangle 205">
+            <a:extLst>
+              <a:ext uri="{FF2B5EF4-FFF2-40B4-BE49-F238E27FC236}">
+                <a16:creationId xmlns:a16="http://schemas.microsoft.com/office/drawing/2014/main" id="{11C50851-6A6A-40F4-8409-82970F52AB99}"/>
+              </a:ext>
+            </a:extLst>
+          </p:cNvPr>
+          <p:cNvSpPr/>
+          <p:nvPr/>
+        </p:nvSpPr>
+        <p:spPr>
+          <a:xfrm>
+            <a:off x="6348048" y="9329996"/>
+            <a:ext cx="765907" cy="749885"/>
+          </a:xfrm>
+          <a:prstGeom prst="rect">
+            <a:avLst/>
+          </a:prstGeom>
+          <a:solidFill>
+            <a:schemeClr val="bg1"/>
+          </a:solidFill>
+          <a:ln w="19050">
+            <a:solidFill>
+              <a:schemeClr val="tx1"/>
+            </a:solidFill>
+          </a:ln>
+        </p:spPr>
+        <p:style>
+          <a:lnRef idx="2">
+            <a:schemeClr val="accent1">
+              <a:shade val="50000"/>
+            </a:schemeClr>
+          </a:lnRef>
+          <a:fillRef idx="1">
+            <a:schemeClr val="accent1"/>
+          </a:fillRef>
+          <a:effectRef idx="0">
+            <a:schemeClr val="accent1"/>
+          </a:effectRef>
+          <a:fontRef idx="minor">
+            <a:schemeClr val="lt1"/>
+          </a:fontRef>
+        </p:style>
+        <p:txBody>
+          <a:bodyPr rot="0" spcFirstLastPara="0" vertOverflow="overflow" horzOverflow="overflow" vert="horz" wrap="square" lIns="53996" tIns="26998" rIns="53996" bIns="26998" numCol="1" spcCol="0" rtlCol="0" fromWordArt="0" anchor="ctr" anchorCtr="0" forceAA="0" compatLnSpc="1">
+            <a:prstTxWarp prst="textNoShape">
+              <a:avLst/>
+            </a:prstTxWarp>
+            <a:noAutofit/>
+          </a:bodyPr>
+          <a:lstStyle/>
+          <a:p>
+            <a:pPr algn="ctr"/>
+            <a:r>
+              <a:rPr lang="en-US" sz="1600" dirty="0">
+                <a:solidFill>
+                  <a:schemeClr val="tx1"/>
+                </a:solidFill>
+                <a:latin typeface="Times New Roman" panose="02020603050405020304" pitchFamily="18" charset="0"/>
+                <a:cs typeface="Times New Roman" panose="02020603050405020304" pitchFamily="18" charset="0"/>
+              </a:rPr>
+              <a:t>O5</a:t>
+            </a:r>
+          </a:p>
+        </p:txBody>
+      </p:sp>
+      <p:sp>
+        <p:nvSpPr>
+          <p:cNvPr id="207" name="Oval 206">
+            <a:extLst>
+              <a:ext uri="{FF2B5EF4-FFF2-40B4-BE49-F238E27FC236}">
+                <a16:creationId xmlns:a16="http://schemas.microsoft.com/office/drawing/2014/main" id="{1204401A-0DF9-4BE5-9A9B-EC0F3C1FB146}"/>
+              </a:ext>
+            </a:extLst>
+          </p:cNvPr>
+          <p:cNvSpPr>
+            <a:spLocks noChangeAspect="1"/>
+          </p:cNvSpPr>
+          <p:nvPr/>
+        </p:nvSpPr>
+        <p:spPr>
+          <a:xfrm>
+            <a:off x="5291016" y="9378966"/>
+            <a:ext cx="680891" cy="666648"/>
+          </a:xfrm>
+          <a:prstGeom prst="ellipse">
+            <a:avLst/>
+          </a:prstGeom>
+          <a:solidFill>
+            <a:schemeClr val="bg1"/>
+          </a:solidFill>
+          <a:ln w="19050">
+            <a:solidFill>
+              <a:schemeClr val="tx1"/>
+            </a:solidFill>
+          </a:ln>
+        </p:spPr>
+        <p:style>
+          <a:lnRef idx="2">
+            <a:schemeClr val="accent1">
+              <a:shade val="50000"/>
+            </a:schemeClr>
+          </a:lnRef>
+          <a:fillRef idx="1">
+            <a:schemeClr val="accent1"/>
+          </a:fillRef>
+          <a:effectRef idx="0">
+            <a:schemeClr val="accent1"/>
+          </a:effectRef>
+          <a:fontRef idx="minor">
+            <a:schemeClr val="lt1"/>
+          </a:fontRef>
+        </p:style>
+        <p:txBody>
+          <a:bodyPr rtlCol="0" anchor="ctr"/>
+          <a:lstStyle/>
+          <a:p>
+            <a:pPr algn="ctr"/>
+            <a:r>
+              <a:rPr lang="en-US" sz="1400" dirty="0">
+                <a:solidFill>
+                  <a:schemeClr val="tx1"/>
+                </a:solidFill>
+                <a:latin typeface="Times New Roman" panose="02020603050405020304" pitchFamily="18" charset="0"/>
+                <a:cs typeface="Times New Roman" panose="02020603050405020304" pitchFamily="18" charset="0"/>
+              </a:rPr>
+              <a:t>u</a:t>
+            </a:r>
+            <a:r>
+              <a:rPr lang="en-US" sz="1400" baseline="-25000" dirty="0">
+                <a:solidFill>
+                  <a:schemeClr val="tx1"/>
+                </a:solidFill>
+                <a:latin typeface="Times New Roman" panose="02020603050405020304" pitchFamily="18" charset="0"/>
+                <a:cs typeface="Times New Roman" panose="02020603050405020304" pitchFamily="18" charset="0"/>
+              </a:rPr>
+              <a:t>O5</a:t>
+            </a:r>
+            <a:endParaRPr lang="en-US" sz="1400" dirty="0">
+              <a:solidFill>
+                <a:schemeClr val="tx1"/>
+              </a:solidFill>
+              <a:latin typeface="Times New Roman" panose="02020603050405020304" pitchFamily="18" charset="0"/>
+              <a:cs typeface="Times New Roman" panose="02020603050405020304" pitchFamily="18" charset="0"/>
+            </a:endParaRPr>
+          </a:p>
+        </p:txBody>
+      </p:sp>
+      <p:sp>
+        <p:nvSpPr>
+          <p:cNvPr id="208" name="Oval 207">
+            <a:extLst>
+              <a:ext uri="{FF2B5EF4-FFF2-40B4-BE49-F238E27FC236}">
+                <a16:creationId xmlns:a16="http://schemas.microsoft.com/office/drawing/2014/main" id="{80E66708-7830-490F-B138-7843051FEB62}"/>
+              </a:ext>
+            </a:extLst>
+          </p:cNvPr>
+          <p:cNvSpPr>
+            <a:spLocks noChangeAspect="1"/>
+          </p:cNvSpPr>
+          <p:nvPr/>
+        </p:nvSpPr>
+        <p:spPr>
+          <a:xfrm>
+            <a:off x="5295602" y="8472881"/>
+            <a:ext cx="680891" cy="666648"/>
+          </a:xfrm>
+          <a:prstGeom prst="ellipse">
+            <a:avLst/>
+          </a:prstGeom>
+          <a:solidFill>
+            <a:schemeClr val="bg1"/>
+          </a:solidFill>
+          <a:ln w="19050">
+            <a:solidFill>
+              <a:schemeClr val="tx1"/>
+            </a:solidFill>
+          </a:ln>
+        </p:spPr>
+        <p:style>
+          <a:lnRef idx="2">
+            <a:schemeClr val="accent1">
+              <a:shade val="50000"/>
+            </a:schemeClr>
+          </a:lnRef>
+          <a:fillRef idx="1">
+            <a:schemeClr val="accent1"/>
+          </a:fillRef>
+          <a:effectRef idx="0">
+            <a:schemeClr val="accent1"/>
+          </a:effectRef>
+          <a:fontRef idx="minor">
+            <a:schemeClr val="lt1"/>
+          </a:fontRef>
+        </p:style>
+        <p:txBody>
+          <a:bodyPr rtlCol="0" anchor="ctr"/>
+          <a:lstStyle/>
+          <a:p>
+            <a:pPr algn="ctr"/>
+            <a:r>
+              <a:rPr lang="en-US" sz="1400" dirty="0">
+                <a:solidFill>
+                  <a:schemeClr val="tx1"/>
+                </a:solidFill>
+                <a:latin typeface="Times New Roman" panose="02020603050405020304" pitchFamily="18" charset="0"/>
+                <a:cs typeface="Times New Roman" panose="02020603050405020304" pitchFamily="18" charset="0"/>
+              </a:rPr>
+              <a:t>u</a:t>
+            </a:r>
+            <a:r>
+              <a:rPr lang="en-US" sz="1400" baseline="-25000" dirty="0">
+                <a:solidFill>
+                  <a:schemeClr val="tx1"/>
+                </a:solidFill>
+                <a:latin typeface="Times New Roman" panose="02020603050405020304" pitchFamily="18" charset="0"/>
+                <a:cs typeface="Times New Roman" panose="02020603050405020304" pitchFamily="18" charset="0"/>
+              </a:rPr>
+              <a:t>O4</a:t>
+            </a:r>
+            <a:endParaRPr lang="en-US" sz="1400" dirty="0">
+              <a:solidFill>
+                <a:schemeClr val="tx1"/>
+              </a:solidFill>
+              <a:latin typeface="Times New Roman" panose="02020603050405020304" pitchFamily="18" charset="0"/>
+              <a:cs typeface="Times New Roman" panose="02020603050405020304" pitchFamily="18" charset="0"/>
+            </a:endParaRPr>
+          </a:p>
+        </p:txBody>
+      </p:sp>
+      <p:cxnSp>
+        <p:nvCxnSpPr>
+          <p:cNvPr id="209" name="Straight Arrow Connector 208">
+            <a:extLst>
+              <a:ext uri="{FF2B5EF4-FFF2-40B4-BE49-F238E27FC236}">
+                <a16:creationId xmlns:a16="http://schemas.microsoft.com/office/drawing/2014/main" id="{6CD9AFC0-A711-4BE4-9981-F830C6FE3E95}"/>
+              </a:ext>
+            </a:extLst>
+          </p:cNvPr>
+          <p:cNvCxnSpPr>
+            <a:cxnSpLocks/>
+            <a:stCxn id="200" idx="2"/>
+            <a:endCxn id="198" idx="3"/>
+          </p:cNvCxnSpPr>
+          <p:nvPr/>
+        </p:nvCxnSpPr>
+        <p:spPr>
+          <a:xfrm flipH="1" flipV="1">
+            <a:off x="7105306" y="7064658"/>
+            <a:ext cx="739361" cy="871379"/>
+          </a:xfrm>
+          <a:prstGeom prst="straightConnector1">
+            <a:avLst/>
+          </a:prstGeom>
+          <a:ln w="19050">
+            <a:solidFill>
+              <a:schemeClr val="tx1"/>
+            </a:solidFill>
+            <a:tailEnd type="triangle"/>
+          </a:ln>
+        </p:spPr>
+        <p:style>
+          <a:lnRef idx="1">
+            <a:schemeClr val="accent1"/>
+          </a:lnRef>
+          <a:fillRef idx="0">
+            <a:schemeClr val="accent1"/>
+          </a:fillRef>
+          <a:effectRef idx="0">
+            <a:schemeClr val="accent1"/>
+          </a:effectRef>
+          <a:fontRef idx="minor">
+            <a:schemeClr val="tx1"/>
+          </a:fontRef>
+        </p:style>
+      </p:cxnSp>
+      <p:cxnSp>
+        <p:nvCxnSpPr>
+          <p:cNvPr id="210" name="Straight Arrow Connector 209">
+            <a:extLst>
+              <a:ext uri="{FF2B5EF4-FFF2-40B4-BE49-F238E27FC236}">
+                <a16:creationId xmlns:a16="http://schemas.microsoft.com/office/drawing/2014/main" id="{0B45D25D-D93D-42B4-89B7-B5C246147C16}"/>
+              </a:ext>
+            </a:extLst>
+          </p:cNvPr>
+          <p:cNvCxnSpPr>
+            <a:cxnSpLocks/>
+            <a:stCxn id="200" idx="2"/>
+            <a:endCxn id="199" idx="3"/>
+          </p:cNvCxnSpPr>
+          <p:nvPr/>
+        </p:nvCxnSpPr>
+        <p:spPr>
+          <a:xfrm flipH="1">
+            <a:off x="7105305" y="7936036"/>
+            <a:ext cx="739362" cy="2463"/>
+          </a:xfrm>
+          <a:prstGeom prst="straightConnector1">
+            <a:avLst/>
+          </a:prstGeom>
+          <a:ln w="19050">
+            <a:solidFill>
+              <a:schemeClr val="tx1"/>
+            </a:solidFill>
+            <a:tailEnd type="triangle"/>
+          </a:ln>
+        </p:spPr>
+        <p:style>
+          <a:lnRef idx="1">
+            <a:schemeClr val="accent1"/>
+          </a:lnRef>
+          <a:fillRef idx="0">
+            <a:schemeClr val="accent1"/>
+          </a:fillRef>
+          <a:effectRef idx="0">
+            <a:schemeClr val="accent1"/>
+          </a:effectRef>
+          <a:fontRef idx="minor">
+            <a:schemeClr val="tx1"/>
+          </a:fontRef>
+        </p:style>
+      </p:cxnSp>
+      <p:cxnSp>
+        <p:nvCxnSpPr>
+          <p:cNvPr id="211" name="Straight Arrow Connector 210">
+            <a:extLst>
+              <a:ext uri="{FF2B5EF4-FFF2-40B4-BE49-F238E27FC236}">
+                <a16:creationId xmlns:a16="http://schemas.microsoft.com/office/drawing/2014/main" id="{A48170FD-E846-43C6-A23A-49D9A6D851DB}"/>
+              </a:ext>
+            </a:extLst>
+          </p:cNvPr>
+          <p:cNvCxnSpPr>
+            <a:cxnSpLocks/>
+            <a:stCxn id="200" idx="2"/>
+            <a:endCxn id="205" idx="3"/>
+          </p:cNvCxnSpPr>
+          <p:nvPr/>
+        </p:nvCxnSpPr>
+        <p:spPr>
+          <a:xfrm flipH="1">
+            <a:off x="7109848" y="7936036"/>
+            <a:ext cx="734819" cy="876305"/>
+          </a:xfrm>
+          <a:prstGeom prst="straightConnector1">
+            <a:avLst/>
+          </a:prstGeom>
+          <a:ln w="19050">
+            <a:solidFill>
+              <a:schemeClr val="tx1"/>
+            </a:solidFill>
+            <a:tailEnd type="triangle"/>
+          </a:ln>
+        </p:spPr>
+        <p:style>
+          <a:lnRef idx="1">
+            <a:schemeClr val="accent1"/>
+          </a:lnRef>
+          <a:fillRef idx="0">
+            <a:schemeClr val="accent1"/>
+          </a:fillRef>
+          <a:effectRef idx="0">
+            <a:schemeClr val="accent1"/>
+          </a:effectRef>
+          <a:fontRef idx="minor">
+            <a:schemeClr val="tx1"/>
+          </a:fontRef>
+        </p:style>
+      </p:cxnSp>
+      <p:cxnSp>
+        <p:nvCxnSpPr>
+          <p:cNvPr id="212" name="Straight Arrow Connector 211">
+            <a:extLst>
+              <a:ext uri="{FF2B5EF4-FFF2-40B4-BE49-F238E27FC236}">
+                <a16:creationId xmlns:a16="http://schemas.microsoft.com/office/drawing/2014/main" id="{855A762C-A00E-4C20-B1F5-447BB7105BF1}"/>
+              </a:ext>
+            </a:extLst>
+          </p:cNvPr>
+          <p:cNvCxnSpPr>
+            <a:cxnSpLocks/>
+            <a:stCxn id="200" idx="2"/>
+            <a:endCxn id="206" idx="3"/>
+          </p:cNvCxnSpPr>
+          <p:nvPr/>
+        </p:nvCxnSpPr>
+        <p:spPr>
+          <a:xfrm flipH="1">
+            <a:off x="7113955" y="7936036"/>
+            <a:ext cx="730713" cy="1768903"/>
+          </a:xfrm>
+          <a:prstGeom prst="straightConnector1">
+            <a:avLst/>
+          </a:prstGeom>
+          <a:ln w="19050">
+            <a:solidFill>
+              <a:schemeClr val="tx1"/>
+            </a:solidFill>
+            <a:tailEnd type="triangle"/>
+          </a:ln>
+        </p:spPr>
+        <p:style>
+          <a:lnRef idx="1">
+            <a:schemeClr val="accent1"/>
+          </a:lnRef>
+          <a:fillRef idx="0">
+            <a:schemeClr val="accent1"/>
+          </a:fillRef>
+          <a:effectRef idx="0">
+            <a:schemeClr val="accent1"/>
+          </a:effectRef>
+          <a:fontRef idx="minor">
+            <a:schemeClr val="tx1"/>
+          </a:fontRef>
+        </p:style>
+      </p:cxnSp>
+      <p:cxnSp>
+        <p:nvCxnSpPr>
+          <p:cNvPr id="213" name="Straight Arrow Connector 212">
+            <a:extLst>
+              <a:ext uri="{FF2B5EF4-FFF2-40B4-BE49-F238E27FC236}">
+                <a16:creationId xmlns:a16="http://schemas.microsoft.com/office/drawing/2014/main" id="{E3291858-DE47-453C-B980-7BF4CEECE0BD}"/>
+              </a:ext>
+            </a:extLst>
+          </p:cNvPr>
+          <p:cNvCxnSpPr>
+            <a:cxnSpLocks/>
+            <a:stCxn id="197" idx="1"/>
+            <a:endCxn id="202" idx="6"/>
+          </p:cNvCxnSpPr>
+          <p:nvPr/>
+        </p:nvCxnSpPr>
+        <p:spPr>
+          <a:xfrm flipH="1" flipV="1">
+            <a:off x="5976493" y="6185955"/>
+            <a:ext cx="362907" cy="3951"/>
+          </a:xfrm>
+          <a:prstGeom prst="straightConnector1">
+            <a:avLst/>
+          </a:prstGeom>
+          <a:ln w="19050">
+            <a:solidFill>
+              <a:schemeClr val="tx1"/>
+            </a:solidFill>
+            <a:tailEnd type="triangle"/>
+          </a:ln>
+        </p:spPr>
+        <p:style>
+          <a:lnRef idx="1">
+            <a:schemeClr val="accent1"/>
+          </a:lnRef>
+          <a:fillRef idx="0">
+            <a:schemeClr val="accent1"/>
+          </a:fillRef>
+          <a:effectRef idx="0">
+            <a:schemeClr val="accent1"/>
+          </a:effectRef>
+          <a:fontRef idx="minor">
+            <a:schemeClr val="tx1"/>
+          </a:fontRef>
+        </p:style>
+      </p:cxnSp>
+      <p:cxnSp>
+        <p:nvCxnSpPr>
+          <p:cNvPr id="214" name="Straight Arrow Connector 213">
+            <a:extLst>
+              <a:ext uri="{FF2B5EF4-FFF2-40B4-BE49-F238E27FC236}">
+                <a16:creationId xmlns:a16="http://schemas.microsoft.com/office/drawing/2014/main" id="{B08C1B3C-1C2C-4E77-977F-25B4F3143EA3}"/>
+              </a:ext>
+            </a:extLst>
+          </p:cNvPr>
+          <p:cNvCxnSpPr>
+            <a:cxnSpLocks/>
+            <a:stCxn id="198" idx="1"/>
+            <a:endCxn id="204" idx="6"/>
+          </p:cNvCxnSpPr>
+          <p:nvPr/>
+        </p:nvCxnSpPr>
+        <p:spPr>
+          <a:xfrm flipH="1">
+            <a:off x="5976493" y="7064658"/>
+            <a:ext cx="362907" cy="5660"/>
+          </a:xfrm>
+          <a:prstGeom prst="straightConnector1">
+            <a:avLst/>
+          </a:prstGeom>
+          <a:ln w="19050">
+            <a:solidFill>
+              <a:schemeClr val="tx1"/>
+            </a:solidFill>
+            <a:tailEnd type="triangle"/>
+          </a:ln>
+        </p:spPr>
+        <p:style>
+          <a:lnRef idx="1">
+            <a:schemeClr val="accent1"/>
+          </a:lnRef>
+          <a:fillRef idx="0">
+            <a:schemeClr val="accent1"/>
+          </a:fillRef>
+          <a:effectRef idx="0">
+            <a:schemeClr val="accent1"/>
+          </a:effectRef>
+          <a:fontRef idx="minor">
+            <a:schemeClr val="tx1"/>
+          </a:fontRef>
+        </p:style>
+      </p:cxnSp>
+      <p:cxnSp>
+        <p:nvCxnSpPr>
+          <p:cNvPr id="215" name="Straight Arrow Connector 214">
+            <a:extLst>
+              <a:ext uri="{FF2B5EF4-FFF2-40B4-BE49-F238E27FC236}">
+                <a16:creationId xmlns:a16="http://schemas.microsoft.com/office/drawing/2014/main" id="{CD1AEE9A-7A07-4CEC-AE94-3CFB894CD4FF}"/>
+              </a:ext>
+            </a:extLst>
+          </p:cNvPr>
+          <p:cNvCxnSpPr>
+            <a:cxnSpLocks/>
+            <a:stCxn id="199" idx="1"/>
+            <a:endCxn id="203" idx="6"/>
+          </p:cNvCxnSpPr>
+          <p:nvPr/>
+        </p:nvCxnSpPr>
+        <p:spPr>
+          <a:xfrm flipH="1" flipV="1">
+            <a:off x="5971907" y="7936038"/>
+            <a:ext cx="367491" cy="2462"/>
+          </a:xfrm>
+          <a:prstGeom prst="straightConnector1">
+            <a:avLst/>
+          </a:prstGeom>
+          <a:ln w="19050">
+            <a:solidFill>
+              <a:schemeClr val="tx1"/>
+            </a:solidFill>
+            <a:tailEnd type="triangle"/>
+          </a:ln>
+        </p:spPr>
+        <p:style>
+          <a:lnRef idx="1">
+            <a:schemeClr val="accent1"/>
+          </a:lnRef>
+          <a:fillRef idx="0">
+            <a:schemeClr val="accent1"/>
+          </a:fillRef>
+          <a:effectRef idx="0">
+            <a:schemeClr val="accent1"/>
+          </a:effectRef>
+          <a:fontRef idx="minor">
+            <a:schemeClr val="tx1"/>
+          </a:fontRef>
+        </p:style>
+      </p:cxnSp>
+      <p:cxnSp>
+        <p:nvCxnSpPr>
+          <p:cNvPr id="216" name="Straight Arrow Connector 215">
+            <a:extLst>
+              <a:ext uri="{FF2B5EF4-FFF2-40B4-BE49-F238E27FC236}">
+                <a16:creationId xmlns:a16="http://schemas.microsoft.com/office/drawing/2014/main" id="{35B80471-BDB7-40D9-AC11-E20382DDED16}"/>
+              </a:ext>
+            </a:extLst>
+          </p:cNvPr>
+          <p:cNvCxnSpPr>
+            <a:cxnSpLocks/>
+            <a:stCxn id="205" idx="1"/>
+            <a:endCxn id="208" idx="6"/>
+          </p:cNvCxnSpPr>
+          <p:nvPr/>
+        </p:nvCxnSpPr>
+        <p:spPr>
+          <a:xfrm flipH="1" flipV="1">
+            <a:off x="5976493" y="8806206"/>
+            <a:ext cx="367448" cy="6135"/>
+          </a:xfrm>
+          <a:prstGeom prst="straightConnector1">
+            <a:avLst/>
+          </a:prstGeom>
+          <a:ln w="19050">
+            <a:solidFill>
+              <a:schemeClr val="tx1"/>
+            </a:solidFill>
+            <a:tailEnd type="triangle"/>
+          </a:ln>
+        </p:spPr>
+        <p:style>
+          <a:lnRef idx="1">
+            <a:schemeClr val="accent1"/>
+          </a:lnRef>
+          <a:fillRef idx="0">
+            <a:schemeClr val="accent1"/>
+          </a:fillRef>
+          <a:effectRef idx="0">
+            <a:schemeClr val="accent1"/>
+          </a:effectRef>
+          <a:fontRef idx="minor">
+            <a:schemeClr val="tx1"/>
+          </a:fontRef>
+        </p:style>
+      </p:cxnSp>
+      <p:cxnSp>
+        <p:nvCxnSpPr>
+          <p:cNvPr id="217" name="Straight Arrow Connector 216">
+            <a:extLst>
+              <a:ext uri="{FF2B5EF4-FFF2-40B4-BE49-F238E27FC236}">
+                <a16:creationId xmlns:a16="http://schemas.microsoft.com/office/drawing/2014/main" id="{FDB29D9D-8DD2-4D81-A97C-20A137B248BA}"/>
+              </a:ext>
+            </a:extLst>
+          </p:cNvPr>
+          <p:cNvCxnSpPr>
+            <a:cxnSpLocks/>
+            <a:stCxn id="206" idx="1"/>
+            <a:endCxn id="207" idx="6"/>
+          </p:cNvCxnSpPr>
+          <p:nvPr/>
+        </p:nvCxnSpPr>
+        <p:spPr>
+          <a:xfrm flipH="1">
+            <a:off x="5971907" y="9704939"/>
+            <a:ext cx="376141" cy="7351"/>
+          </a:xfrm>
+          <a:prstGeom prst="straightConnector1">
+            <a:avLst/>
+          </a:prstGeom>
+          <a:ln w="19050">
+            <a:solidFill>
+              <a:schemeClr val="tx1"/>
+            </a:solidFill>
+            <a:tailEnd type="triangle"/>
+          </a:ln>
+        </p:spPr>
+        <p:style>
+          <a:lnRef idx="1">
+            <a:schemeClr val="accent1"/>
+          </a:lnRef>
+          <a:fillRef idx="0">
+            <a:schemeClr val="accent1"/>
+          </a:fillRef>
+          <a:effectRef idx="0">
+            <a:schemeClr val="accent1"/>
+          </a:effectRef>
+          <a:fontRef idx="minor">
+            <a:schemeClr val="tx1"/>
+          </a:fontRef>
+        </p:style>
+      </p:cxnSp>
+      <p:cxnSp>
+        <p:nvCxnSpPr>
+          <p:cNvPr id="285" name="Connector: Curved 284">
+            <a:extLst>
+              <a:ext uri="{FF2B5EF4-FFF2-40B4-BE49-F238E27FC236}">
+                <a16:creationId xmlns:a16="http://schemas.microsoft.com/office/drawing/2014/main" id="{34F52958-883D-4F51-A216-5149F925C9E5}"/>
+              </a:ext>
+            </a:extLst>
+          </p:cNvPr>
+          <p:cNvCxnSpPr>
+            <a:cxnSpLocks/>
+            <a:stCxn id="91" idx="4"/>
+            <a:endCxn id="200" idx="0"/>
+          </p:cNvCxnSpPr>
+          <p:nvPr/>
+        </p:nvCxnSpPr>
+        <p:spPr>
+          <a:xfrm rot="5400000">
+            <a:off x="6914172" y="5388308"/>
+            <a:ext cx="3495130" cy="10404"/>
+          </a:xfrm>
+          <a:prstGeom prst="curvedConnector3">
+            <a:avLst>
+              <a:gd name="adj1" fmla="val 50000"/>
+            </a:avLst>
+          </a:prstGeom>
+          <a:ln w="25400">
+            <a:solidFill>
+              <a:schemeClr val="tx1"/>
+            </a:solidFill>
+            <a:headEnd type="arrow"/>
+            <a:tailEnd type="arrow"/>
+          </a:ln>
+        </p:spPr>
+        <p:style>
+          <a:lnRef idx="1">
+            <a:schemeClr val="accent1"/>
+          </a:lnRef>
+          <a:fillRef idx="0">
+            <a:schemeClr val="accent1"/>
+          </a:fillRef>
+          <a:effectRef idx="0">
+            <a:schemeClr val="accent1"/>
+          </a:effectRef>
+          <a:fontRef idx="minor">
+            <a:schemeClr val="tx1"/>
+          </a:fontRef>
+        </p:style>
+      </p:cxnSp>
+      <p:sp>
+        <p:nvSpPr>
+          <p:cNvPr id="73" name="Rectangle 72">
+            <a:extLst>
+              <a:ext uri="{FF2B5EF4-FFF2-40B4-BE49-F238E27FC236}">
+                <a16:creationId xmlns:a16="http://schemas.microsoft.com/office/drawing/2014/main" id="{7BA7F865-961A-4B8B-8BF8-BEED59EBCA7E}"/>
+              </a:ext>
+            </a:extLst>
+          </p:cNvPr>
+          <p:cNvSpPr>
+            <a:spLocks/>
+          </p:cNvSpPr>
+          <p:nvPr/>
+        </p:nvSpPr>
+        <p:spPr>
+          <a:xfrm>
+            <a:off x="1320955" y="3987208"/>
+            <a:ext cx="1260000" cy="1260000"/>
+          </a:xfrm>
+          <a:prstGeom prst="rect">
+            <a:avLst/>
+          </a:prstGeom>
+          <a:solidFill>
+            <a:schemeClr val="bg1"/>
+          </a:solidFill>
+          <a:ln w="19050">
+            <a:solidFill>
+              <a:schemeClr val="tx1"/>
+            </a:solidFill>
+          </a:ln>
+        </p:spPr>
+        <p:style>
+          <a:lnRef idx="2">
+            <a:schemeClr val="accent1">
+              <a:shade val="50000"/>
+            </a:schemeClr>
+          </a:lnRef>
+          <a:fillRef idx="1">
+            <a:schemeClr val="accent1"/>
+          </a:fillRef>
+          <a:effectRef idx="0">
+            <a:schemeClr val="accent1"/>
+          </a:effectRef>
+          <a:fontRef idx="minor">
+            <a:schemeClr val="lt1"/>
+          </a:fontRef>
+        </p:style>
+        <p:txBody>
+          <a:bodyPr rot="0" spcFirstLastPara="0" vertOverflow="overflow" horzOverflow="overflow" vert="horz" wrap="square" lIns="53996" tIns="26998" rIns="53996" bIns="26998" numCol="1" spcCol="0" rtlCol="0" fromWordArt="0" anchor="ctr" anchorCtr="0" forceAA="0" compatLnSpc="1">
+            <a:prstTxWarp prst="textNoShape">
+              <a:avLst/>
+            </a:prstTxWarp>
+            <a:noAutofit/>
+          </a:bodyPr>
+          <a:lstStyle/>
+          <a:p>
+            <a:pPr algn="ctr"/>
+            <a:r>
+              <a:rPr lang="en-US" sz="1600" dirty="0">
+                <a:solidFill>
+                  <a:schemeClr val="tx1"/>
+                </a:solidFill>
+                <a:latin typeface="Times New Roman" panose="02020603050405020304" pitchFamily="18" charset="0"/>
+                <a:cs typeface="Times New Roman" panose="02020603050405020304" pitchFamily="18" charset="0"/>
+              </a:rPr>
+              <a:t>Income</a:t>
+            </a:r>
+          </a:p>
+        </p:txBody>
+      </p:sp>
+      <p:sp>
+        <p:nvSpPr>
+          <p:cNvPr id="74" name="Rectangle 73">
+            <a:extLst>
+              <a:ext uri="{FF2B5EF4-FFF2-40B4-BE49-F238E27FC236}">
+                <a16:creationId xmlns:a16="http://schemas.microsoft.com/office/drawing/2014/main" id="{75683ACF-2715-4420-ADE0-94DF9AB7EFF9}"/>
+              </a:ext>
+            </a:extLst>
+          </p:cNvPr>
+          <p:cNvSpPr>
+            <a:spLocks/>
+          </p:cNvSpPr>
+          <p:nvPr/>
+        </p:nvSpPr>
+        <p:spPr>
+          <a:xfrm>
+            <a:off x="1320955" y="5555955"/>
+            <a:ext cx="1260000" cy="1260000"/>
+          </a:xfrm>
+          <a:prstGeom prst="rect">
+            <a:avLst/>
+          </a:prstGeom>
+          <a:solidFill>
+            <a:schemeClr val="bg1"/>
+          </a:solidFill>
+          <a:ln w="19050">
+            <a:solidFill>
+              <a:schemeClr val="tx1"/>
+            </a:solidFill>
+          </a:ln>
+        </p:spPr>
+        <p:style>
+          <a:lnRef idx="2">
+            <a:schemeClr val="accent1">
+              <a:shade val="50000"/>
+            </a:schemeClr>
+          </a:lnRef>
+          <a:fillRef idx="1">
+            <a:schemeClr val="accent1"/>
+          </a:fillRef>
+          <a:effectRef idx="0">
+            <a:schemeClr val="accent1"/>
+          </a:effectRef>
+          <a:fontRef idx="minor">
+            <a:schemeClr val="lt1"/>
+          </a:fontRef>
+        </p:style>
+        <p:txBody>
+          <a:bodyPr rot="0" spcFirstLastPara="0" vertOverflow="overflow" horzOverflow="overflow" vert="horz" wrap="square" lIns="53996" tIns="26998" rIns="53996" bIns="26998" numCol="1" spcCol="0" rtlCol="0" fromWordArt="0" anchor="ctr" anchorCtr="0" forceAA="0" compatLnSpc="1">
+            <a:prstTxWarp prst="textNoShape">
+              <a:avLst/>
+            </a:prstTxWarp>
+            <a:noAutofit/>
+          </a:bodyPr>
+          <a:lstStyle/>
+          <a:p>
+            <a:pPr algn="ctr"/>
+            <a:r>
+              <a:rPr lang="en-US" sz="1600" dirty="0">
+                <a:solidFill>
+                  <a:schemeClr val="tx1"/>
+                </a:solidFill>
+                <a:latin typeface="Times New Roman" panose="02020603050405020304" pitchFamily="18" charset="0"/>
+                <a:cs typeface="Times New Roman" panose="02020603050405020304" pitchFamily="18" charset="0"/>
+              </a:rPr>
+              <a:t>Age</a:t>
+            </a:r>
+          </a:p>
+        </p:txBody>
+      </p:sp>
+      <p:cxnSp>
+        <p:nvCxnSpPr>
+          <p:cNvPr id="75" name="Connector: Curved 74">
+            <a:extLst>
+              <a:ext uri="{FF2B5EF4-FFF2-40B4-BE49-F238E27FC236}">
+                <a16:creationId xmlns:a16="http://schemas.microsoft.com/office/drawing/2014/main" id="{92C4ED2B-B7EC-4A39-B0AF-86C1EA4C4883}"/>
+              </a:ext>
+            </a:extLst>
+          </p:cNvPr>
+          <p:cNvCxnSpPr>
+            <a:cxnSpLocks/>
+            <a:stCxn id="95" idx="2"/>
+            <a:endCxn id="73" idx="0"/>
+          </p:cNvCxnSpPr>
+          <p:nvPr/>
+        </p:nvCxnSpPr>
+        <p:spPr>
+          <a:xfrm rot="10800000" flipV="1">
+            <a:off x="1950956" y="1090872"/>
+            <a:ext cx="3344647" cy="2896335"/>
+          </a:xfrm>
+          <a:prstGeom prst="curvedConnector2">
+            <a:avLst/>
+          </a:prstGeom>
+          <a:ln w="25400">
+            <a:solidFill>
+              <a:schemeClr val="tx1"/>
+            </a:solidFill>
+            <a:headEnd type="arrow"/>
+            <a:tailEnd type="arrow"/>
+          </a:ln>
+        </p:spPr>
+        <p:style>
+          <a:lnRef idx="1">
+            <a:schemeClr val="accent1"/>
+          </a:lnRef>
+          <a:fillRef idx="0">
+            <a:schemeClr val="accent1"/>
+          </a:fillRef>
+          <a:effectRef idx="0">
+            <a:schemeClr val="accent1"/>
+          </a:effectRef>
+          <a:fontRef idx="minor">
+            <a:schemeClr val="tx1"/>
+          </a:fontRef>
+        </p:style>
+      </p:cxnSp>
+      <p:cxnSp>
+        <p:nvCxnSpPr>
+          <p:cNvPr id="78" name="Connector: Curved 77">
+            <a:extLst>
+              <a:ext uri="{FF2B5EF4-FFF2-40B4-BE49-F238E27FC236}">
+                <a16:creationId xmlns:a16="http://schemas.microsoft.com/office/drawing/2014/main" id="{62127300-75A6-4EE4-BD69-80FC7259B374}"/>
+              </a:ext>
+            </a:extLst>
+          </p:cNvPr>
+          <p:cNvCxnSpPr>
+            <a:cxnSpLocks/>
+            <a:stCxn id="74" idx="1"/>
+            <a:endCxn id="73" idx="1"/>
+          </p:cNvCxnSpPr>
+          <p:nvPr/>
+        </p:nvCxnSpPr>
+        <p:spPr>
+          <a:xfrm rot="10800000">
+            <a:off x="1320955" y="4617209"/>
+            <a:ext cx="12700" cy="1568747"/>
+          </a:xfrm>
+          <a:prstGeom prst="curvedConnector3">
+            <a:avLst>
+              <a:gd name="adj1" fmla="val 5789189"/>
+            </a:avLst>
+          </a:prstGeom>
+          <a:ln w="25400">
+            <a:solidFill>
+              <a:schemeClr val="tx1"/>
+            </a:solidFill>
+            <a:headEnd type="arrow"/>
+            <a:tailEnd type="arrow"/>
+          </a:ln>
+        </p:spPr>
+        <p:style>
+          <a:lnRef idx="1">
+            <a:schemeClr val="accent1"/>
+          </a:lnRef>
+          <a:fillRef idx="0">
+            <a:schemeClr val="accent1"/>
+          </a:fillRef>
+          <a:effectRef idx="0">
+            <a:schemeClr val="accent1"/>
+          </a:effectRef>
+          <a:fontRef idx="minor">
+            <a:schemeClr val="tx1"/>
+          </a:fontRef>
+        </p:style>
+      </p:cxnSp>
+      <p:cxnSp>
+        <p:nvCxnSpPr>
+          <p:cNvPr id="86" name="Connector: Curved 85">
+            <a:extLst>
+              <a:ext uri="{FF2B5EF4-FFF2-40B4-BE49-F238E27FC236}">
+                <a16:creationId xmlns:a16="http://schemas.microsoft.com/office/drawing/2014/main" id="{5729E60A-06C6-4AA2-B4C2-FAE22F55AC91}"/>
+              </a:ext>
+            </a:extLst>
+          </p:cNvPr>
+          <p:cNvCxnSpPr>
+            <a:cxnSpLocks/>
+            <a:stCxn id="99" idx="2"/>
+            <a:endCxn id="73" idx="0"/>
+          </p:cNvCxnSpPr>
+          <p:nvPr/>
+        </p:nvCxnSpPr>
+        <p:spPr>
+          <a:xfrm rot="10800000" flipV="1">
+            <a:off x="1950956" y="1975234"/>
+            <a:ext cx="3344647" cy="2011973"/>
+          </a:xfrm>
+          <a:prstGeom prst="curvedConnector2">
+            <a:avLst/>
+          </a:prstGeom>
+          <a:ln w="25400">
+            <a:solidFill>
+              <a:schemeClr val="tx1"/>
+            </a:solidFill>
+            <a:headEnd type="arrow"/>
+            <a:tailEnd type="arrow"/>
+          </a:ln>
+        </p:spPr>
+        <p:style>
+          <a:lnRef idx="1">
+            <a:schemeClr val="accent1"/>
+          </a:lnRef>
+          <a:fillRef idx="0">
+            <a:schemeClr val="accent1"/>
+          </a:fillRef>
+          <a:effectRef idx="0">
+            <a:schemeClr val="accent1"/>
+          </a:effectRef>
+          <a:fontRef idx="minor">
+            <a:schemeClr val="tx1"/>
+          </a:fontRef>
+        </p:style>
+      </p:cxnSp>
+      <p:cxnSp>
+        <p:nvCxnSpPr>
+          <p:cNvPr id="87" name="Connector: Curved 86">
+            <a:extLst>
+              <a:ext uri="{FF2B5EF4-FFF2-40B4-BE49-F238E27FC236}">
+                <a16:creationId xmlns:a16="http://schemas.microsoft.com/office/drawing/2014/main" id="{0BC2E89A-A22C-4CFD-AC2F-194C340E24F8}"/>
+              </a:ext>
+            </a:extLst>
+          </p:cNvPr>
+          <p:cNvCxnSpPr>
+            <a:cxnSpLocks/>
+            <a:stCxn id="97" idx="2"/>
+            <a:endCxn id="73" idx="0"/>
+          </p:cNvCxnSpPr>
+          <p:nvPr/>
+        </p:nvCxnSpPr>
+        <p:spPr>
+          <a:xfrm rot="10800000" flipV="1">
+            <a:off x="1950956" y="2840954"/>
+            <a:ext cx="3340061" cy="1146253"/>
+          </a:xfrm>
+          <a:prstGeom prst="curvedConnector2">
+            <a:avLst/>
+          </a:prstGeom>
+          <a:ln w="25400">
+            <a:solidFill>
+              <a:schemeClr val="tx1"/>
+            </a:solidFill>
+            <a:headEnd type="arrow"/>
+            <a:tailEnd type="arrow"/>
+          </a:ln>
+        </p:spPr>
+        <p:style>
+          <a:lnRef idx="1">
+            <a:schemeClr val="accent1"/>
+          </a:lnRef>
+          <a:fillRef idx="0">
+            <a:schemeClr val="accent1"/>
+          </a:fillRef>
+          <a:effectRef idx="0">
+            <a:schemeClr val="accent1"/>
+          </a:effectRef>
+          <a:fontRef idx="minor">
+            <a:schemeClr val="tx1"/>
+          </a:fontRef>
+        </p:style>
+      </p:cxnSp>
+      <p:cxnSp>
+        <p:nvCxnSpPr>
+          <p:cNvPr id="94" name="Connector: Curved 93">
+            <a:extLst>
+              <a:ext uri="{FF2B5EF4-FFF2-40B4-BE49-F238E27FC236}">
+                <a16:creationId xmlns:a16="http://schemas.microsoft.com/office/drawing/2014/main" id="{1AEE4E1B-D17C-4F25-B747-1AAB7337732A}"/>
+              </a:ext>
+            </a:extLst>
+          </p:cNvPr>
+          <p:cNvCxnSpPr>
+            <a:cxnSpLocks/>
+            <a:stCxn id="109" idx="2"/>
+            <a:endCxn id="73" idx="3"/>
+          </p:cNvCxnSpPr>
+          <p:nvPr/>
+        </p:nvCxnSpPr>
+        <p:spPr>
+          <a:xfrm rot="10800000">
+            <a:off x="2580956" y="4617208"/>
+            <a:ext cx="2710061" cy="12700"/>
+          </a:xfrm>
+          <a:prstGeom prst="curvedConnector3">
+            <a:avLst>
+              <a:gd name="adj1" fmla="val 50000"/>
+            </a:avLst>
+          </a:prstGeom>
+          <a:ln w="25400">
+            <a:solidFill>
+              <a:schemeClr val="tx1"/>
+            </a:solidFill>
+            <a:headEnd type="arrow"/>
+            <a:tailEnd type="arrow"/>
+          </a:ln>
+        </p:spPr>
+        <p:style>
+          <a:lnRef idx="1">
+            <a:schemeClr val="accent1"/>
+          </a:lnRef>
+          <a:fillRef idx="0">
+            <a:schemeClr val="accent1"/>
+          </a:fillRef>
+          <a:effectRef idx="0">
+            <a:schemeClr val="accent1"/>
+          </a:effectRef>
+          <a:fontRef idx="minor">
+            <a:schemeClr val="tx1"/>
+          </a:fontRef>
+        </p:style>
+      </p:cxnSp>
+      <p:cxnSp>
+        <p:nvCxnSpPr>
+          <p:cNvPr id="100" name="Connector: Curved 99">
+            <a:extLst>
+              <a:ext uri="{FF2B5EF4-FFF2-40B4-BE49-F238E27FC236}">
+                <a16:creationId xmlns:a16="http://schemas.microsoft.com/office/drawing/2014/main" id="{D7E7ADDF-2AA7-4995-ADC0-D4C035B8543F}"/>
+              </a:ext>
+            </a:extLst>
+          </p:cNvPr>
+          <p:cNvCxnSpPr>
+            <a:cxnSpLocks/>
+            <a:stCxn id="207" idx="2"/>
+            <a:endCxn id="74" idx="2"/>
+          </p:cNvCxnSpPr>
+          <p:nvPr/>
+        </p:nvCxnSpPr>
+        <p:spPr>
+          <a:xfrm rot="10800000">
+            <a:off x="1950956" y="6815956"/>
+            <a:ext cx="3340061" cy="2896335"/>
+          </a:xfrm>
+          <a:prstGeom prst="curvedConnector2">
+            <a:avLst/>
+          </a:prstGeom>
+          <a:ln w="25400">
+            <a:solidFill>
+              <a:schemeClr val="tx1"/>
+            </a:solidFill>
+            <a:headEnd type="arrow"/>
+            <a:tailEnd type="arrow"/>
+          </a:ln>
+        </p:spPr>
+        <p:style>
+          <a:lnRef idx="1">
+            <a:schemeClr val="accent1"/>
+          </a:lnRef>
+          <a:fillRef idx="0">
+            <a:schemeClr val="accent1"/>
+          </a:fillRef>
+          <a:effectRef idx="0">
+            <a:schemeClr val="accent1"/>
+          </a:effectRef>
+          <a:fontRef idx="minor">
+            <a:schemeClr val="tx1"/>
+          </a:fontRef>
+        </p:style>
+      </p:cxnSp>
+      <p:cxnSp>
+        <p:nvCxnSpPr>
+          <p:cNvPr id="106" name="Connector: Curved 105">
+            <a:extLst>
+              <a:ext uri="{FF2B5EF4-FFF2-40B4-BE49-F238E27FC236}">
+                <a16:creationId xmlns:a16="http://schemas.microsoft.com/office/drawing/2014/main" id="{188E0054-6114-4AB6-A5AE-93A01C61BC59}"/>
+              </a:ext>
+            </a:extLst>
+          </p:cNvPr>
+          <p:cNvCxnSpPr>
+            <a:cxnSpLocks/>
+            <a:stCxn id="208" idx="2"/>
+            <a:endCxn id="74" idx="2"/>
+          </p:cNvCxnSpPr>
+          <p:nvPr/>
+        </p:nvCxnSpPr>
+        <p:spPr>
+          <a:xfrm rot="10800000">
+            <a:off x="1950956" y="6815955"/>
+            <a:ext cx="3344647" cy="1990250"/>
+          </a:xfrm>
+          <a:prstGeom prst="curvedConnector2">
+            <a:avLst/>
+          </a:prstGeom>
+          <a:ln w="25400">
+            <a:solidFill>
+              <a:schemeClr val="tx1"/>
+            </a:solidFill>
+            <a:headEnd type="arrow"/>
+            <a:tailEnd type="arrow"/>
+          </a:ln>
+        </p:spPr>
+        <p:style>
+          <a:lnRef idx="1">
+            <a:schemeClr val="accent1"/>
+          </a:lnRef>
+          <a:fillRef idx="0">
+            <a:schemeClr val="accent1"/>
+          </a:fillRef>
+          <a:effectRef idx="0">
+            <a:schemeClr val="accent1"/>
+          </a:effectRef>
+          <a:fontRef idx="minor">
+            <a:schemeClr val="tx1"/>
+          </a:fontRef>
+        </p:style>
+      </p:cxnSp>
+      <p:cxnSp>
+        <p:nvCxnSpPr>
+          <p:cNvPr id="107" name="Connector: Curved 106">
+            <a:extLst>
+              <a:ext uri="{FF2B5EF4-FFF2-40B4-BE49-F238E27FC236}">
+                <a16:creationId xmlns:a16="http://schemas.microsoft.com/office/drawing/2014/main" id="{0AAA6F76-9045-4518-8C08-27342435DEEE}"/>
+              </a:ext>
+            </a:extLst>
+          </p:cNvPr>
+          <p:cNvCxnSpPr>
+            <a:cxnSpLocks/>
+            <a:stCxn id="203" idx="2"/>
+            <a:endCxn id="74" idx="2"/>
+          </p:cNvCxnSpPr>
+          <p:nvPr/>
+        </p:nvCxnSpPr>
+        <p:spPr>
+          <a:xfrm rot="10800000">
+            <a:off x="1950956" y="6815955"/>
+            <a:ext cx="3340061" cy="1120082"/>
+          </a:xfrm>
+          <a:prstGeom prst="curvedConnector2">
+            <a:avLst/>
+          </a:prstGeom>
+          <a:ln w="25400">
+            <a:solidFill>
+              <a:schemeClr val="tx1"/>
+            </a:solidFill>
+            <a:headEnd type="arrow"/>
+            <a:tailEnd type="arrow"/>
+          </a:ln>
+        </p:spPr>
+        <p:style>
+          <a:lnRef idx="1">
+            <a:schemeClr val="accent1"/>
+          </a:lnRef>
+          <a:fillRef idx="0">
+            <a:schemeClr val="accent1"/>
+          </a:fillRef>
+          <a:effectRef idx="0">
+            <a:schemeClr val="accent1"/>
+          </a:effectRef>
+          <a:fontRef idx="minor">
+            <a:schemeClr val="tx1"/>
+          </a:fontRef>
+        </p:style>
+      </p:cxnSp>
+      <p:cxnSp>
+        <p:nvCxnSpPr>
+          <p:cNvPr id="108" name="Connector: Curved 107">
+            <a:extLst>
+              <a:ext uri="{FF2B5EF4-FFF2-40B4-BE49-F238E27FC236}">
+                <a16:creationId xmlns:a16="http://schemas.microsoft.com/office/drawing/2014/main" id="{3173FAB0-CA76-4E89-9204-C5ADE02C4679}"/>
+              </a:ext>
+            </a:extLst>
+          </p:cNvPr>
+          <p:cNvCxnSpPr>
+            <a:cxnSpLocks/>
+            <a:stCxn id="202" idx="2"/>
+            <a:endCxn id="74" idx="3"/>
+          </p:cNvCxnSpPr>
+          <p:nvPr/>
+        </p:nvCxnSpPr>
+        <p:spPr>
+          <a:xfrm rot="10800000">
+            <a:off x="2580956" y="6185955"/>
+            <a:ext cx="2714647" cy="12700"/>
+          </a:xfrm>
+          <a:prstGeom prst="curvedConnector3">
+            <a:avLst>
+              <a:gd name="adj1" fmla="val 50000"/>
+            </a:avLst>
+          </a:prstGeom>
+          <a:ln w="25400">
+            <a:solidFill>
+              <a:schemeClr val="tx1"/>
+            </a:solidFill>
+            <a:headEnd type="arrow"/>
+            <a:tailEnd type="arrow"/>
+          </a:ln>
+        </p:spPr>
+        <p:style>
+          <a:lnRef idx="1">
+            <a:schemeClr val="accent1"/>
+          </a:lnRef>
+          <a:fillRef idx="0">
+            <a:schemeClr val="accent1"/>
+          </a:fillRef>
+          <a:effectRef idx="0">
+            <a:schemeClr val="accent1"/>
+          </a:effectRef>
+          <a:fontRef idx="minor">
+            <a:schemeClr val="tx1"/>
+          </a:fontRef>
+        </p:style>
+      </p:cxnSp>
+      <p:cxnSp>
+        <p:nvCxnSpPr>
+          <p:cNvPr id="237" name="Straight Arrow Connector 236">
+            <a:extLst>
+              <a:ext uri="{FF2B5EF4-FFF2-40B4-BE49-F238E27FC236}">
+                <a16:creationId xmlns:a16="http://schemas.microsoft.com/office/drawing/2014/main" id="{00C381D8-01A1-471A-9179-1FF1AA344649}"/>
+              </a:ext>
+            </a:extLst>
+          </p:cNvPr>
+          <p:cNvCxnSpPr>
+            <a:cxnSpLocks/>
+            <a:stCxn id="73" idx="3"/>
+            <a:endCxn id="202" idx="2"/>
+          </p:cNvCxnSpPr>
+          <p:nvPr/>
+        </p:nvCxnSpPr>
+        <p:spPr>
+          <a:xfrm>
+            <a:off x="2580955" y="4617208"/>
+            <a:ext cx="2714647" cy="1568747"/>
+          </a:xfrm>
+          <a:prstGeom prst="straightConnector1">
+            <a:avLst/>
+          </a:prstGeom>
+          <a:ln w="25400">
+            <a:solidFill>
+              <a:schemeClr val="tx1"/>
+            </a:solidFill>
+            <a:headEnd type="arrow"/>
+            <a:tailEnd type="arrow"/>
+          </a:ln>
+        </p:spPr>
+        <p:style>
+          <a:lnRef idx="1">
+            <a:schemeClr val="accent1"/>
+          </a:lnRef>
+          <a:fillRef idx="0">
+            <a:schemeClr val="accent1"/>
+          </a:fillRef>
+          <a:effectRef idx="0">
+            <a:schemeClr val="accent1"/>
+          </a:effectRef>
+          <a:fontRef idx="minor">
+            <a:schemeClr val="tx1"/>
+          </a:fontRef>
+        </p:style>
+      </p:cxnSp>
+      <p:cxnSp>
+        <p:nvCxnSpPr>
+          <p:cNvPr id="125" name="Straight Arrow Connector 124">
+            <a:extLst>
+              <a:ext uri="{FF2B5EF4-FFF2-40B4-BE49-F238E27FC236}">
+                <a16:creationId xmlns:a16="http://schemas.microsoft.com/office/drawing/2014/main" id="{4914E5BE-D1A2-4A75-91D3-7FC08C1599EF}"/>
+              </a:ext>
+            </a:extLst>
+          </p:cNvPr>
+          <p:cNvCxnSpPr>
+            <a:cxnSpLocks/>
+            <a:stCxn id="73" idx="3"/>
+            <a:endCxn id="204" idx="2"/>
+          </p:cNvCxnSpPr>
+          <p:nvPr/>
+        </p:nvCxnSpPr>
+        <p:spPr>
+          <a:xfrm>
+            <a:off x="2580955" y="4617208"/>
+            <a:ext cx="2714647" cy="2453109"/>
+          </a:xfrm>
+          <a:prstGeom prst="straightConnector1">
+            <a:avLst/>
+          </a:prstGeom>
+          <a:ln w="25400">
+            <a:solidFill>
+              <a:schemeClr val="tx1"/>
+            </a:solidFill>
+            <a:headEnd type="arrow"/>
+            <a:tailEnd type="arrow"/>
+          </a:ln>
+        </p:spPr>
+        <p:style>
+          <a:lnRef idx="1">
+            <a:schemeClr val="accent1"/>
+          </a:lnRef>
+          <a:fillRef idx="0">
+            <a:schemeClr val="accent1"/>
+          </a:fillRef>
+          <a:effectRef idx="0">
+            <a:schemeClr val="accent1"/>
+          </a:effectRef>
+          <a:fontRef idx="minor">
+            <a:schemeClr val="tx1"/>
+          </a:fontRef>
+        </p:style>
+      </p:cxnSp>
+      <p:cxnSp>
+        <p:nvCxnSpPr>
+          <p:cNvPr id="128" name="Straight Arrow Connector 127">
+            <a:extLst>
+              <a:ext uri="{FF2B5EF4-FFF2-40B4-BE49-F238E27FC236}">
+                <a16:creationId xmlns:a16="http://schemas.microsoft.com/office/drawing/2014/main" id="{F0EE7045-A75A-4277-8C86-18C0B7A09D5C}"/>
+              </a:ext>
+            </a:extLst>
+          </p:cNvPr>
+          <p:cNvCxnSpPr>
+            <a:cxnSpLocks/>
+            <a:stCxn id="73" idx="3"/>
+            <a:endCxn id="203" idx="2"/>
+          </p:cNvCxnSpPr>
+          <p:nvPr/>
+        </p:nvCxnSpPr>
+        <p:spPr>
+          <a:xfrm>
+            <a:off x="2580955" y="4617208"/>
+            <a:ext cx="2710061" cy="3318829"/>
+          </a:xfrm>
+          <a:prstGeom prst="straightConnector1">
+            <a:avLst/>
+          </a:prstGeom>
+          <a:ln w="25400">
+            <a:solidFill>
+              <a:schemeClr val="tx1"/>
+            </a:solidFill>
+            <a:headEnd type="arrow"/>
+            <a:tailEnd type="arrow"/>
+          </a:ln>
+        </p:spPr>
+        <p:style>
+          <a:lnRef idx="1">
+            <a:schemeClr val="accent1"/>
+          </a:lnRef>
+          <a:fillRef idx="0">
+            <a:schemeClr val="accent1"/>
+          </a:fillRef>
+          <a:effectRef idx="0">
+            <a:schemeClr val="accent1"/>
+          </a:effectRef>
+          <a:fontRef idx="minor">
+            <a:schemeClr val="tx1"/>
+          </a:fontRef>
+        </p:style>
+      </p:cxnSp>
+      <p:cxnSp>
+        <p:nvCxnSpPr>
+          <p:cNvPr id="132" name="Straight Arrow Connector 131">
+            <a:extLst>
+              <a:ext uri="{FF2B5EF4-FFF2-40B4-BE49-F238E27FC236}">
+                <a16:creationId xmlns:a16="http://schemas.microsoft.com/office/drawing/2014/main" id="{31C79820-6B61-4C9C-8F06-64FE7E13BC1F}"/>
+              </a:ext>
+            </a:extLst>
+          </p:cNvPr>
+          <p:cNvCxnSpPr>
+            <a:cxnSpLocks/>
+            <a:stCxn id="73" idx="3"/>
+            <a:endCxn id="208" idx="2"/>
+          </p:cNvCxnSpPr>
+          <p:nvPr/>
+        </p:nvCxnSpPr>
+        <p:spPr>
+          <a:xfrm>
+            <a:off x="2580955" y="4617208"/>
+            <a:ext cx="2714647" cy="4188997"/>
+          </a:xfrm>
+          <a:prstGeom prst="straightConnector1">
+            <a:avLst/>
+          </a:prstGeom>
+          <a:ln w="25400">
+            <a:solidFill>
+              <a:schemeClr val="tx1"/>
+            </a:solidFill>
+            <a:headEnd type="arrow"/>
+            <a:tailEnd type="arrow"/>
+          </a:ln>
+        </p:spPr>
+        <p:style>
+          <a:lnRef idx="1">
+            <a:schemeClr val="accent1"/>
+          </a:lnRef>
+          <a:fillRef idx="0">
+            <a:schemeClr val="accent1"/>
+          </a:fillRef>
+          <a:effectRef idx="0">
+            <a:schemeClr val="accent1"/>
+          </a:effectRef>
+          <a:fontRef idx="minor">
+            <a:schemeClr val="tx1"/>
+          </a:fontRef>
+        </p:style>
+      </p:cxnSp>
+      <p:cxnSp>
+        <p:nvCxnSpPr>
+          <p:cNvPr id="136" name="Straight Arrow Connector 135">
+            <a:extLst>
+              <a:ext uri="{FF2B5EF4-FFF2-40B4-BE49-F238E27FC236}">
+                <a16:creationId xmlns:a16="http://schemas.microsoft.com/office/drawing/2014/main" id="{D2DAC75B-A179-4CCA-B169-DC82C7B53422}"/>
+              </a:ext>
+            </a:extLst>
+          </p:cNvPr>
+          <p:cNvCxnSpPr>
+            <a:cxnSpLocks/>
+            <a:stCxn id="73" idx="3"/>
+            <a:endCxn id="207" idx="2"/>
+          </p:cNvCxnSpPr>
+          <p:nvPr/>
+        </p:nvCxnSpPr>
+        <p:spPr>
+          <a:xfrm>
+            <a:off x="2580955" y="4617208"/>
+            <a:ext cx="2710061" cy="5095082"/>
+          </a:xfrm>
+          <a:prstGeom prst="straightConnector1">
+            <a:avLst/>
+          </a:prstGeom>
+          <a:ln w="25400">
+            <a:solidFill>
+              <a:schemeClr val="tx1"/>
+            </a:solidFill>
+            <a:headEnd type="arrow"/>
+            <a:tailEnd type="arrow"/>
+          </a:ln>
+        </p:spPr>
+        <p:style>
+          <a:lnRef idx="1">
+            <a:schemeClr val="accent1"/>
+          </a:lnRef>
+          <a:fillRef idx="0">
+            <a:schemeClr val="accent1"/>
+          </a:fillRef>
+          <a:effectRef idx="0">
+            <a:schemeClr val="accent1"/>
+          </a:effectRef>
+          <a:fontRef idx="minor">
+            <a:schemeClr val="tx1"/>
+          </a:fontRef>
+        </p:style>
+      </p:cxnSp>
+      <p:cxnSp>
+        <p:nvCxnSpPr>
+          <p:cNvPr id="139" name="Straight Arrow Connector 138">
+            <a:extLst>
+              <a:ext uri="{FF2B5EF4-FFF2-40B4-BE49-F238E27FC236}">
+                <a16:creationId xmlns:a16="http://schemas.microsoft.com/office/drawing/2014/main" id="{9EA53F5B-2079-451F-9DFC-A00918DEC1CD}"/>
+              </a:ext>
+            </a:extLst>
+          </p:cNvPr>
+          <p:cNvCxnSpPr>
+            <a:cxnSpLocks/>
+            <a:stCxn id="73" idx="3"/>
+            <a:endCxn id="112" idx="2"/>
+          </p:cNvCxnSpPr>
+          <p:nvPr/>
+        </p:nvCxnSpPr>
+        <p:spPr>
+          <a:xfrm flipV="1">
+            <a:off x="2580955" y="3711123"/>
+            <a:ext cx="2714647" cy="906085"/>
+          </a:xfrm>
+          <a:prstGeom prst="straightConnector1">
+            <a:avLst/>
+          </a:prstGeom>
+          <a:ln w="25400">
+            <a:solidFill>
+              <a:schemeClr val="tx1"/>
+            </a:solidFill>
+            <a:headEnd type="arrow"/>
+            <a:tailEnd type="arrow"/>
+          </a:ln>
+        </p:spPr>
+        <p:style>
+          <a:lnRef idx="1">
+            <a:schemeClr val="accent1"/>
+          </a:lnRef>
+          <a:fillRef idx="0">
+            <a:schemeClr val="accent1"/>
+          </a:fillRef>
+          <a:effectRef idx="0">
+            <a:schemeClr val="accent1"/>
+          </a:effectRef>
+          <a:fontRef idx="minor">
+            <a:schemeClr val="tx1"/>
+          </a:fontRef>
+        </p:style>
+      </p:cxnSp>
+      <p:cxnSp>
+        <p:nvCxnSpPr>
+          <p:cNvPr id="142" name="Straight Arrow Connector 141">
+            <a:extLst>
+              <a:ext uri="{FF2B5EF4-FFF2-40B4-BE49-F238E27FC236}">
+                <a16:creationId xmlns:a16="http://schemas.microsoft.com/office/drawing/2014/main" id="{4A7CDA85-E8F0-4BDF-99C4-7C36015E1D83}"/>
+              </a:ext>
+            </a:extLst>
+          </p:cNvPr>
+          <p:cNvCxnSpPr>
+            <a:cxnSpLocks/>
+            <a:stCxn id="74" idx="3"/>
+            <a:endCxn id="204" idx="2"/>
+          </p:cNvCxnSpPr>
+          <p:nvPr/>
+        </p:nvCxnSpPr>
+        <p:spPr>
+          <a:xfrm>
+            <a:off x="2580955" y="6185955"/>
+            <a:ext cx="2714647" cy="884362"/>
+          </a:xfrm>
+          <a:prstGeom prst="straightConnector1">
+            <a:avLst/>
+          </a:prstGeom>
+          <a:ln w="25400">
+            <a:solidFill>
+              <a:schemeClr val="tx1"/>
+            </a:solidFill>
+            <a:headEnd type="arrow"/>
+            <a:tailEnd type="arrow"/>
+          </a:ln>
+        </p:spPr>
+        <p:style>
+          <a:lnRef idx="1">
+            <a:schemeClr val="accent1"/>
+          </a:lnRef>
+          <a:fillRef idx="0">
+            <a:schemeClr val="accent1"/>
+          </a:fillRef>
+          <a:effectRef idx="0">
+            <a:schemeClr val="accent1"/>
+          </a:effectRef>
+          <a:fontRef idx="minor">
+            <a:schemeClr val="tx1"/>
+          </a:fontRef>
+        </p:style>
+      </p:cxnSp>
+      <p:cxnSp>
+        <p:nvCxnSpPr>
+          <p:cNvPr id="145" name="Straight Arrow Connector 144">
+            <a:extLst>
+              <a:ext uri="{FF2B5EF4-FFF2-40B4-BE49-F238E27FC236}">
+                <a16:creationId xmlns:a16="http://schemas.microsoft.com/office/drawing/2014/main" id="{17E8A057-29CB-4300-8C8D-60A7B2208A78}"/>
+              </a:ext>
+            </a:extLst>
+          </p:cNvPr>
+          <p:cNvCxnSpPr>
+            <a:cxnSpLocks/>
+            <a:stCxn id="74" idx="3"/>
+            <a:endCxn id="109" idx="2"/>
+          </p:cNvCxnSpPr>
+          <p:nvPr/>
+        </p:nvCxnSpPr>
+        <p:spPr>
+          <a:xfrm flipV="1">
+            <a:off x="2580955" y="4617208"/>
+            <a:ext cx="2710061" cy="1568747"/>
+          </a:xfrm>
+          <a:prstGeom prst="straightConnector1">
+            <a:avLst/>
+          </a:prstGeom>
+          <a:ln w="25400">
+            <a:solidFill>
+              <a:schemeClr val="tx1"/>
+            </a:solidFill>
+            <a:headEnd type="arrow"/>
+            <a:tailEnd type="arrow"/>
+          </a:ln>
+        </p:spPr>
+        <p:style>
+          <a:lnRef idx="1">
+            <a:schemeClr val="accent1"/>
+          </a:lnRef>
+          <a:fillRef idx="0">
+            <a:schemeClr val="accent1"/>
+          </a:fillRef>
+          <a:effectRef idx="0">
+            <a:schemeClr val="accent1"/>
+          </a:effectRef>
+          <a:fontRef idx="minor">
+            <a:schemeClr val="tx1"/>
+          </a:fontRef>
+        </p:style>
+      </p:cxnSp>
+      <p:cxnSp>
+        <p:nvCxnSpPr>
+          <p:cNvPr id="148" name="Straight Arrow Connector 147">
+            <a:extLst>
+              <a:ext uri="{FF2B5EF4-FFF2-40B4-BE49-F238E27FC236}">
+                <a16:creationId xmlns:a16="http://schemas.microsoft.com/office/drawing/2014/main" id="{E6FFB376-2D15-45F1-A1F6-ED54C886C4B0}"/>
+              </a:ext>
+            </a:extLst>
+          </p:cNvPr>
+          <p:cNvCxnSpPr>
+            <a:cxnSpLocks/>
+            <a:stCxn id="74" idx="3"/>
+            <a:endCxn id="112" idx="2"/>
+          </p:cNvCxnSpPr>
+          <p:nvPr/>
+        </p:nvCxnSpPr>
+        <p:spPr>
+          <a:xfrm flipV="1">
+            <a:off x="2580955" y="3711123"/>
+            <a:ext cx="2714647" cy="2474832"/>
+          </a:xfrm>
+          <a:prstGeom prst="straightConnector1">
+            <a:avLst/>
+          </a:prstGeom>
+          <a:ln w="25400">
+            <a:solidFill>
+              <a:schemeClr val="tx1"/>
+            </a:solidFill>
+            <a:headEnd type="arrow"/>
+            <a:tailEnd type="arrow"/>
+          </a:ln>
+        </p:spPr>
+        <p:style>
+          <a:lnRef idx="1">
+            <a:schemeClr val="accent1"/>
+          </a:lnRef>
+          <a:fillRef idx="0">
+            <a:schemeClr val="accent1"/>
+          </a:fillRef>
+          <a:effectRef idx="0">
+            <a:schemeClr val="accent1"/>
+          </a:effectRef>
+          <a:fontRef idx="minor">
+            <a:schemeClr val="tx1"/>
+          </a:fontRef>
+        </p:style>
+      </p:cxnSp>
+      <p:cxnSp>
+        <p:nvCxnSpPr>
+          <p:cNvPr id="151" name="Straight Arrow Connector 150">
+            <a:extLst>
+              <a:ext uri="{FF2B5EF4-FFF2-40B4-BE49-F238E27FC236}">
+                <a16:creationId xmlns:a16="http://schemas.microsoft.com/office/drawing/2014/main" id="{AD14614E-9481-45F7-BC01-32A59DD50DD8}"/>
+              </a:ext>
+            </a:extLst>
+          </p:cNvPr>
+          <p:cNvCxnSpPr>
+            <a:cxnSpLocks/>
+            <a:stCxn id="74" idx="3"/>
+            <a:endCxn id="97" idx="2"/>
+          </p:cNvCxnSpPr>
+          <p:nvPr/>
+        </p:nvCxnSpPr>
+        <p:spPr>
+          <a:xfrm flipV="1">
+            <a:off x="2580955" y="2840955"/>
+            <a:ext cx="2710061" cy="3345000"/>
+          </a:xfrm>
+          <a:prstGeom prst="straightConnector1">
+            <a:avLst/>
+          </a:prstGeom>
+          <a:ln w="25400">
+            <a:solidFill>
+              <a:schemeClr val="tx1"/>
+            </a:solidFill>
+            <a:headEnd type="arrow"/>
+            <a:tailEnd type="arrow"/>
+          </a:ln>
+        </p:spPr>
+        <p:style>
+          <a:lnRef idx="1">
+            <a:schemeClr val="accent1"/>
+          </a:lnRef>
+          <a:fillRef idx="0">
+            <a:schemeClr val="accent1"/>
+          </a:fillRef>
+          <a:effectRef idx="0">
+            <a:schemeClr val="accent1"/>
+          </a:effectRef>
+          <a:fontRef idx="minor">
+            <a:schemeClr val="tx1"/>
+          </a:fontRef>
+        </p:style>
+      </p:cxnSp>
+      <p:cxnSp>
+        <p:nvCxnSpPr>
+          <p:cNvPr id="154" name="Straight Arrow Connector 153">
+            <a:extLst>
+              <a:ext uri="{FF2B5EF4-FFF2-40B4-BE49-F238E27FC236}">
+                <a16:creationId xmlns:a16="http://schemas.microsoft.com/office/drawing/2014/main" id="{265E0084-F93B-442B-9ECF-C46D9BA98E0D}"/>
+              </a:ext>
+            </a:extLst>
+          </p:cNvPr>
+          <p:cNvCxnSpPr>
+            <a:cxnSpLocks/>
+            <a:stCxn id="74" idx="3"/>
+            <a:endCxn id="99" idx="2"/>
+          </p:cNvCxnSpPr>
+          <p:nvPr/>
+        </p:nvCxnSpPr>
+        <p:spPr>
+          <a:xfrm flipV="1">
+            <a:off x="2580955" y="1975235"/>
+            <a:ext cx="2714647" cy="4210720"/>
+          </a:xfrm>
+          <a:prstGeom prst="straightConnector1">
+            <a:avLst/>
+          </a:prstGeom>
+          <a:ln w="25400">
+            <a:solidFill>
+              <a:schemeClr val="tx1"/>
+            </a:solidFill>
+            <a:headEnd type="arrow"/>
+            <a:tailEnd type="arrow"/>
+          </a:ln>
+        </p:spPr>
+        <p:style>
+          <a:lnRef idx="1">
+            <a:schemeClr val="accent1"/>
+          </a:lnRef>
+          <a:fillRef idx="0">
+            <a:schemeClr val="accent1"/>
+          </a:fillRef>
+          <a:effectRef idx="0">
+            <a:schemeClr val="accent1"/>
+          </a:effectRef>
+          <a:fontRef idx="minor">
+            <a:schemeClr val="tx1"/>
+          </a:fontRef>
+        </p:style>
+      </p:cxnSp>
+      <p:cxnSp>
+        <p:nvCxnSpPr>
+          <p:cNvPr id="157" name="Straight Arrow Connector 156">
+            <a:extLst>
+              <a:ext uri="{FF2B5EF4-FFF2-40B4-BE49-F238E27FC236}">
+                <a16:creationId xmlns:a16="http://schemas.microsoft.com/office/drawing/2014/main" id="{F8A52256-89A9-4773-A8A1-AF476BC044B6}"/>
+              </a:ext>
+            </a:extLst>
+          </p:cNvPr>
+          <p:cNvCxnSpPr>
+            <a:cxnSpLocks/>
+            <a:stCxn id="74" idx="3"/>
+            <a:endCxn id="95" idx="2"/>
+          </p:cNvCxnSpPr>
+          <p:nvPr/>
+        </p:nvCxnSpPr>
+        <p:spPr>
+          <a:xfrm flipV="1">
+            <a:off x="2580955" y="1090873"/>
+            <a:ext cx="2714647" cy="5095082"/>
+          </a:xfrm>
+          <a:prstGeom prst="straightConnector1">
+            <a:avLst/>
+          </a:prstGeom>
+          <a:ln w="25400">
+            <a:solidFill>
+              <a:schemeClr val="tx1"/>
+            </a:solidFill>
+            <a:headEnd type="arrow"/>
+            <a:tailEnd type="arrow"/>
+          </a:ln>
+        </p:spPr>
+        <p:style>
+          <a:lnRef idx="1">
+            <a:schemeClr val="accent1"/>
+          </a:lnRef>
+          <a:fillRef idx="0">
+            <a:schemeClr val="accent1"/>
+          </a:fillRef>
+          <a:effectRef idx="0">
+            <a:schemeClr val="accent1"/>
+          </a:effectRef>
+          <a:fontRef idx="minor">
+            <a:schemeClr val="tx1"/>
+          </a:fontRef>
+        </p:style>
+      </p:cxnSp>
+    </p:spTree>
+    <p:extLst>
+      <p:ext uri="{BB962C8B-B14F-4D97-AF65-F5344CB8AC3E}">
+        <p14:creationId xmlns:p14="http://schemas.microsoft.com/office/powerpoint/2010/main" val="2835676228"/>
+      </p:ext>
+    </p:extLst>
+  </p:cSld>
+  <p:clrMapOvr>
+    <a:masterClrMapping/>
+  </p:clrMapOvr>
+</p:sld>
+</file>
+
 <file path=ppt/theme/theme1.xml><?xml version="1.0" encoding="utf-8"?>
 <a:theme xmlns:a="http://schemas.openxmlformats.org/drawingml/2006/main" name="Office Theme">
   <a:themeElements>

</xml_diff>